<commit_message>
UIX Config file updates
</commit_message>
<xml_diff>
--- a/Display Output/Display Output.pptx
+++ b/Display Output/Display Output.pptx
@@ -232,6 +232,103 @@
 </p:cmAuthorLst>
 </file>
 
+<file path=ppt/revisionInfo.xml><?xml version="1.0" encoding="utf-8"?>
+<p1510:revInfo xmlns:a="http://schemas.openxmlformats.org/drawingml/2006/main" xmlns:r="http://schemas.openxmlformats.org/officeDocument/2006/relationships" xmlns:p1510="http://schemas.microsoft.com/office/powerpoint/2015/10/main">
+  <p1510:revLst>
+    <p1510:client id="{9FDB2BC7-2661-4B7C-8DD5-C5D25E0C1299}" v="199" dt="2021-01-11T02:37:13.562"/>
+  </p1510:revLst>
+</p1510:revInfo>
+</file>
+
+<file path=ppt/changesInfos/changesInfo1.xml><?xml version="1.0" encoding="utf-8"?>
+<pc:chgInfo xmlns:a="http://schemas.openxmlformats.org/drawingml/2006/main" xmlns:r="http://schemas.openxmlformats.org/officeDocument/2006/relationships" xmlns:ac="http://schemas.microsoft.com/office/drawing/2013/main/command" xmlns:pc="http://schemas.microsoft.com/office/powerpoint/2013/main/command">
+  <pc:docChgLst>
+    <pc:chgData name="Ryan Downer" userId="f95fd30141f730ab" providerId="LiveId" clId="{9FDB2BC7-2661-4B7C-8DD5-C5D25E0C1299}"/>
+    <pc:docChg chg="undo custSel modSld">
+      <pc:chgData name="Ryan Downer" userId="f95fd30141f730ab" providerId="LiveId" clId="{9FDB2BC7-2661-4B7C-8DD5-C5D25E0C1299}" dt="2021-01-11T02:53:49.786" v="230" actId="20577"/>
+      <pc:docMkLst>
+        <pc:docMk/>
+      </pc:docMkLst>
+      <pc:sldChg chg="modSp mod">
+        <pc:chgData name="Ryan Downer" userId="f95fd30141f730ab" providerId="LiveId" clId="{9FDB2BC7-2661-4B7C-8DD5-C5D25E0C1299}" dt="2021-01-11T02:53:49.786" v="230" actId="20577"/>
+        <pc:sldMkLst>
+          <pc:docMk/>
+          <pc:sldMk cId="3316225305" sldId="260"/>
+        </pc:sldMkLst>
+        <pc:graphicFrameChg chg="mod modGraphic">
+          <ac:chgData name="Ryan Downer" userId="f95fd30141f730ab" providerId="LiveId" clId="{9FDB2BC7-2661-4B7C-8DD5-C5D25E0C1299}" dt="2021-01-11T02:53:49.786" v="230" actId="20577"/>
+          <ac:graphicFrameMkLst>
+            <pc:docMk/>
+            <pc:sldMk cId="3316225305" sldId="260"/>
+            <ac:graphicFrameMk id="5" creationId="{00000000-0000-0000-0000-000000000000}"/>
+          </ac:graphicFrameMkLst>
+        </pc:graphicFrameChg>
+      </pc:sldChg>
+      <pc:sldChg chg="modSp">
+        <pc:chgData name="Ryan Downer" userId="f95fd30141f730ab" providerId="LiveId" clId="{9FDB2BC7-2661-4B7C-8DD5-C5D25E0C1299}" dt="2021-01-11T01:58:05.950" v="194"/>
+        <pc:sldMkLst>
+          <pc:docMk/>
+          <pc:sldMk cId="412912464" sldId="288"/>
+        </pc:sldMkLst>
+        <pc:graphicFrameChg chg="mod">
+          <ac:chgData name="Ryan Downer" userId="f95fd30141f730ab" providerId="LiveId" clId="{9FDB2BC7-2661-4B7C-8DD5-C5D25E0C1299}" dt="2021-01-11T01:58:05.950" v="194"/>
+          <ac:graphicFrameMkLst>
+            <pc:docMk/>
+            <pc:sldMk cId="412912464" sldId="288"/>
+            <ac:graphicFrameMk id="16" creationId="{0292BB8C-E52F-41E7-B963-9A610C852500}"/>
+          </ac:graphicFrameMkLst>
+        </pc:graphicFrameChg>
+      </pc:sldChg>
+      <pc:sldChg chg="modSp">
+        <pc:chgData name="Ryan Downer" userId="f95fd30141f730ab" providerId="LiveId" clId="{9FDB2BC7-2661-4B7C-8DD5-C5D25E0C1299}" dt="2021-01-11T02:03:06.833" v="195"/>
+        <pc:sldMkLst>
+          <pc:docMk/>
+          <pc:sldMk cId="1567773350" sldId="289"/>
+        </pc:sldMkLst>
+        <pc:graphicFrameChg chg="mod">
+          <ac:chgData name="Ryan Downer" userId="f95fd30141f730ab" providerId="LiveId" clId="{9FDB2BC7-2661-4B7C-8DD5-C5D25E0C1299}" dt="2021-01-11T02:03:06.833" v="195"/>
+          <ac:graphicFrameMkLst>
+            <pc:docMk/>
+            <pc:sldMk cId="1567773350" sldId="289"/>
+            <ac:graphicFrameMk id="16" creationId="{0292BB8C-E52F-41E7-B963-9A610C852500}"/>
+          </ac:graphicFrameMkLst>
+        </pc:graphicFrameChg>
+      </pc:sldChg>
+      <pc:sldChg chg="modSp">
+        <pc:chgData name="Ryan Downer" userId="f95fd30141f730ab" providerId="LiveId" clId="{9FDB2BC7-2661-4B7C-8DD5-C5D25E0C1299}" dt="2021-01-11T01:40:01.696" v="172"/>
+        <pc:sldMkLst>
+          <pc:docMk/>
+          <pc:sldMk cId="3731898135" sldId="290"/>
+        </pc:sldMkLst>
+        <pc:graphicFrameChg chg="mod">
+          <ac:chgData name="Ryan Downer" userId="f95fd30141f730ab" providerId="LiveId" clId="{9FDB2BC7-2661-4B7C-8DD5-C5D25E0C1299}" dt="2021-01-11T01:40:01.696" v="172"/>
+          <ac:graphicFrameMkLst>
+            <pc:docMk/>
+            <pc:sldMk cId="3731898135" sldId="290"/>
+            <ac:graphicFrameMk id="16" creationId="{0292BB8C-E52F-41E7-B963-9A610C852500}"/>
+          </ac:graphicFrameMkLst>
+        </pc:graphicFrameChg>
+      </pc:sldChg>
+      <pc:sldChg chg="modSp mod">
+        <pc:chgData name="Ryan Downer" userId="f95fd30141f730ab" providerId="LiveId" clId="{9FDB2BC7-2661-4B7C-8DD5-C5D25E0C1299}" dt="2021-01-11T01:34:00.557" v="1" actId="14100"/>
+        <pc:sldMkLst>
+          <pc:docMk/>
+          <pc:sldMk cId="488771252" sldId="292"/>
+        </pc:sldMkLst>
+        <pc:graphicFrameChg chg="modGraphic">
+          <ac:chgData name="Ryan Downer" userId="f95fd30141f730ab" providerId="LiveId" clId="{9FDB2BC7-2661-4B7C-8DD5-C5D25E0C1299}" dt="2021-01-11T01:34:00.557" v="1" actId="14100"/>
+          <ac:graphicFrameMkLst>
+            <pc:docMk/>
+            <pc:sldMk cId="488771252" sldId="292"/>
+            <ac:graphicFrameMk id="10" creationId="{80B2914A-4C11-4F3E-9967-F9365E1EE813}"/>
+          </ac:graphicFrameMkLst>
+        </pc:graphicFrameChg>
+      </pc:sldChg>
+    </pc:docChg>
+  </pc:docChgLst>
+</pc:chgInfo>
+</file>
+
 <file path=ppt/diagrams/colors1.xml><?xml version="1.0" encoding="utf-8"?>
 <dgm:colorsDef xmlns:dgm="http://schemas.openxmlformats.org/drawingml/2006/diagram" xmlns:a="http://schemas.openxmlformats.org/drawingml/2006/main" uniqueId="urn:microsoft.com/office/officeart/2005/8/colors/accent1_2">
   <dgm:title val=""/>
@@ -3221,167 +3318,85 @@
 </file>
 
 <file path=ppt/diagrams/colors5.xml><?xml version="1.0" encoding="utf-8"?>
-<dgm:colorsDef xmlns:dgm="http://schemas.openxmlformats.org/drawingml/2006/diagram" xmlns:a="http://schemas.openxmlformats.org/drawingml/2006/main" uniqueId="urn:microsoft.com/office/officeart/2005/8/colors/accent1_2">
+<dgm:colorsDef xmlns:dgm="http://schemas.openxmlformats.org/drawingml/2006/diagram" xmlns:a="http://schemas.openxmlformats.org/drawingml/2006/main" uniqueId="urn:microsoft.com/office/officeart/2005/8/colors/accent0_1">
   <dgm:title val=""/>
   <dgm:desc val=""/>
   <dgm:catLst>
-    <dgm:cat type="accent1" pri="11200"/>
+    <dgm:cat type="mainScheme" pri="10100"/>
   </dgm:catLst>
   <dgm:styleLbl name="node0">
     <dgm:fillClrLst meth="repeat">
-      <a:schemeClr val="accent1"/>
+      <a:schemeClr val="lt1"/>
     </dgm:fillClrLst>
     <dgm:linClrLst meth="repeat">
-      <a:schemeClr val="lt1"/>
+      <a:schemeClr val="dk1">
+        <a:shade val="80000"/>
+      </a:schemeClr>
     </dgm:linClrLst>
     <dgm:effectClrLst/>
     <dgm:txLinClrLst/>
-    <dgm:txFillClrLst/>
+    <dgm:txFillClrLst meth="repeat">
+      <a:schemeClr val="dk1"/>
+    </dgm:txFillClrLst>
     <dgm:txEffectClrLst/>
   </dgm:styleLbl>
-  <dgm:styleLbl name="alignNode1">
+  <dgm:styleLbl name="node1">
     <dgm:fillClrLst meth="repeat">
-      <a:schemeClr val="accent1"/>
+      <a:schemeClr val="lt1"/>
     </dgm:fillClrLst>
     <dgm:linClrLst meth="repeat">
-      <a:schemeClr val="accent1"/>
+      <a:schemeClr val="dk1">
+        <a:shade val="80000"/>
+      </a:schemeClr>
     </dgm:linClrLst>
     <dgm:effectClrLst/>
     <dgm:txLinClrLst/>
-    <dgm:txFillClrLst/>
+    <dgm:txFillClrLst meth="repeat">
+      <a:schemeClr val="dk1"/>
+    </dgm:txFillClrLst>
     <dgm:txEffectClrLst/>
   </dgm:styleLbl>
-  <dgm:styleLbl name="node1">
+  <dgm:styleLbl name="alignNode1">
     <dgm:fillClrLst meth="repeat">
-      <a:schemeClr val="accent1"/>
+      <a:schemeClr val="lt1"/>
     </dgm:fillClrLst>
     <dgm:linClrLst meth="repeat">
-      <a:schemeClr val="lt1"/>
+      <a:schemeClr val="dk1">
+        <a:shade val="80000"/>
+      </a:schemeClr>
     </dgm:linClrLst>
     <dgm:effectClrLst/>
     <dgm:txLinClrLst/>
-    <dgm:txFillClrLst/>
+    <dgm:txFillClrLst meth="repeat">
+      <a:schemeClr val="dk1"/>
+    </dgm:txFillClrLst>
     <dgm:txEffectClrLst/>
   </dgm:styleLbl>
   <dgm:styleLbl name="lnNode1">
     <dgm:fillClrLst meth="repeat">
-      <a:schemeClr val="accent1"/>
+      <a:schemeClr val="lt1"/>
     </dgm:fillClrLst>
     <dgm:linClrLst meth="repeat">
-      <a:schemeClr val="lt1"/>
+      <a:schemeClr val="dk1">
+        <a:shade val="80000"/>
+      </a:schemeClr>
     </dgm:linClrLst>
     <dgm:effectClrLst/>
     <dgm:txLinClrLst/>
-    <dgm:txFillClrLst/>
+    <dgm:txFillClrLst meth="repeat">
+      <a:schemeClr val="dk1"/>
+    </dgm:txFillClrLst>
     <dgm:txEffectClrLst/>
   </dgm:styleLbl>
   <dgm:styleLbl name="vennNode1">
     <dgm:fillClrLst meth="repeat">
-      <a:schemeClr val="accent1">
+      <a:schemeClr val="lt1">
         <a:alpha val="50000"/>
       </a:schemeClr>
     </dgm:fillClrLst>
     <dgm:linClrLst meth="repeat">
-      <a:schemeClr val="lt1"/>
-    </dgm:linClrLst>
-    <dgm:effectClrLst/>
-    <dgm:txLinClrLst/>
-    <dgm:txFillClrLst/>
-    <dgm:txEffectClrLst/>
-  </dgm:styleLbl>
-  <dgm:styleLbl name="node2">
-    <dgm:fillClrLst meth="repeat">
-      <a:schemeClr val="accent1"/>
-    </dgm:fillClrLst>
-    <dgm:linClrLst meth="repeat">
-      <a:schemeClr val="lt1"/>
-    </dgm:linClrLst>
-    <dgm:effectClrLst/>
-    <dgm:txLinClrLst/>
-    <dgm:txFillClrLst/>
-    <dgm:txEffectClrLst/>
-  </dgm:styleLbl>
-  <dgm:styleLbl name="node3">
-    <dgm:fillClrLst meth="repeat">
-      <a:schemeClr val="accent1"/>
-    </dgm:fillClrLst>
-    <dgm:linClrLst meth="repeat">
-      <a:schemeClr val="lt1"/>
-    </dgm:linClrLst>
-    <dgm:effectClrLst/>
-    <dgm:txLinClrLst/>
-    <dgm:txFillClrLst/>
-    <dgm:txEffectClrLst/>
-  </dgm:styleLbl>
-  <dgm:styleLbl name="node4">
-    <dgm:fillClrLst meth="repeat">
-      <a:schemeClr val="accent1"/>
-    </dgm:fillClrLst>
-    <dgm:linClrLst meth="repeat">
-      <a:schemeClr val="lt1"/>
-    </dgm:linClrLst>
-    <dgm:effectClrLst/>
-    <dgm:txLinClrLst/>
-    <dgm:txFillClrLst/>
-    <dgm:txEffectClrLst/>
-  </dgm:styleLbl>
-  <dgm:styleLbl name="fgImgPlace1">
-    <dgm:fillClrLst meth="repeat">
-      <a:schemeClr val="accent1">
-        <a:tint val="50000"/>
-      </a:schemeClr>
-    </dgm:fillClrLst>
-    <dgm:linClrLst meth="repeat">
-      <a:schemeClr val="lt1"/>
-    </dgm:linClrLst>
-    <dgm:effectClrLst/>
-    <dgm:txLinClrLst/>
-    <dgm:txFillClrLst meth="repeat">
-      <a:schemeClr val="lt1"/>
-    </dgm:txFillClrLst>
-    <dgm:txEffectClrLst/>
-  </dgm:styleLbl>
-  <dgm:styleLbl name="alignImgPlace1">
-    <dgm:fillClrLst meth="repeat">
-      <a:schemeClr val="accent1">
-        <a:tint val="50000"/>
-      </a:schemeClr>
-    </dgm:fillClrLst>
-    <dgm:linClrLst meth="repeat">
-      <a:schemeClr val="lt1"/>
-    </dgm:linClrLst>
-    <dgm:effectClrLst/>
-    <dgm:txLinClrLst/>
-    <dgm:txFillClrLst meth="repeat">
-      <a:schemeClr val="lt1"/>
-    </dgm:txFillClrLst>
-    <dgm:txEffectClrLst/>
-  </dgm:styleLbl>
-  <dgm:styleLbl name="bgImgPlace1">
-    <dgm:fillClrLst meth="repeat">
-      <a:schemeClr val="accent1">
-        <a:tint val="50000"/>
-      </a:schemeClr>
-    </dgm:fillClrLst>
-    <dgm:linClrLst meth="repeat">
-      <a:schemeClr val="lt1"/>
-    </dgm:linClrLst>
-    <dgm:effectClrLst/>
-    <dgm:txLinClrLst/>
-    <dgm:txFillClrLst meth="repeat">
-      <a:schemeClr val="lt1"/>
-    </dgm:txFillClrLst>
-    <dgm:txEffectClrLst/>
-  </dgm:styleLbl>
-  <dgm:styleLbl name="sibTrans2D1">
-    <dgm:fillClrLst meth="repeat">
-      <a:schemeClr val="accent1">
-        <a:tint val="60000"/>
-      </a:schemeClr>
-    </dgm:fillClrLst>
-    <dgm:linClrLst meth="repeat">
-      <a:schemeClr val="accent1">
-        <a:tint val="60000"/>
+      <a:schemeClr val="dk1">
+        <a:shade val="80000"/>
       </a:schemeClr>
     </dgm:linClrLst>
     <dgm:effectClrLst/>
@@ -3389,137 +3404,63 @@
     <dgm:txFillClrLst/>
     <dgm:txEffectClrLst/>
   </dgm:styleLbl>
-  <dgm:styleLbl name="fgSibTrans2D1">
+  <dgm:styleLbl name="node2">
     <dgm:fillClrLst meth="repeat">
-      <a:schemeClr val="accent1">
-        <a:tint val="60000"/>
-      </a:schemeClr>
+      <a:schemeClr val="lt1"/>
     </dgm:fillClrLst>
     <dgm:linClrLst meth="repeat">
-      <a:schemeClr val="accent1">
-        <a:tint val="60000"/>
-      </a:schemeClr>
-    </dgm:linClrLst>
-    <dgm:effectClrLst/>
-    <dgm:txLinClrLst/>
-    <dgm:txFillClrLst/>
-    <dgm:txEffectClrLst/>
-  </dgm:styleLbl>
-  <dgm:styleLbl name="bgSibTrans2D1">
-    <dgm:fillClrLst meth="repeat">
-      <a:schemeClr val="accent1">
-        <a:tint val="60000"/>
-      </a:schemeClr>
-    </dgm:fillClrLst>
-    <dgm:linClrLst meth="repeat">
-      <a:schemeClr val="accent1">
-        <a:tint val="60000"/>
-      </a:schemeClr>
-    </dgm:linClrLst>
-    <dgm:effectClrLst/>
-    <dgm:txLinClrLst/>
-    <dgm:txFillClrLst/>
-    <dgm:txEffectClrLst/>
-  </dgm:styleLbl>
-  <dgm:styleLbl name="sibTrans1D1">
-    <dgm:fillClrLst meth="repeat">
-      <a:schemeClr val="accent1"/>
-    </dgm:fillClrLst>
-    <dgm:linClrLst meth="repeat">
-      <a:schemeClr val="accent1"/>
-    </dgm:linClrLst>
-    <dgm:effectClrLst/>
-    <dgm:txLinClrLst/>
-    <dgm:txFillClrLst meth="repeat">
-      <a:schemeClr val="tx1"/>
-    </dgm:txFillClrLst>
-    <dgm:txEffectClrLst/>
-  </dgm:styleLbl>
-  <dgm:styleLbl name="callout">
-    <dgm:fillClrLst meth="repeat">
-      <a:schemeClr val="accent1"/>
-    </dgm:fillClrLst>
-    <dgm:linClrLst meth="repeat">
-      <a:schemeClr val="accent1">
-        <a:tint val="50000"/>
+      <a:schemeClr val="dk1">
+        <a:shade val="80000"/>
       </a:schemeClr>
     </dgm:linClrLst>
     <dgm:effectClrLst/>
     <dgm:txLinClrLst/>
     <dgm:txFillClrLst meth="repeat">
-      <a:schemeClr val="tx1"/>
+      <a:schemeClr val="dk1"/>
     </dgm:txFillClrLst>
     <dgm:txEffectClrLst/>
   </dgm:styleLbl>
-  <dgm:styleLbl name="asst0">
+  <dgm:styleLbl name="node3">
     <dgm:fillClrLst meth="repeat">
-      <a:schemeClr val="accent1"/>
+      <a:schemeClr val="lt1"/>
     </dgm:fillClrLst>
     <dgm:linClrLst meth="repeat">
-      <a:schemeClr val="lt1"/>
+      <a:schemeClr val="dk1">
+        <a:shade val="80000"/>
+      </a:schemeClr>
     </dgm:linClrLst>
     <dgm:effectClrLst/>
     <dgm:txLinClrLst/>
-    <dgm:txFillClrLst/>
+    <dgm:txFillClrLst meth="repeat">
+      <a:schemeClr val="dk1"/>
+    </dgm:txFillClrLst>
     <dgm:txEffectClrLst/>
   </dgm:styleLbl>
-  <dgm:styleLbl name="asst1">
+  <dgm:styleLbl name="node4">
     <dgm:fillClrLst meth="repeat">
-      <a:schemeClr val="accent1"/>
+      <a:schemeClr val="lt1"/>
     </dgm:fillClrLst>
     <dgm:linClrLst meth="repeat">
-      <a:schemeClr val="lt1"/>
+      <a:schemeClr val="dk1">
+        <a:shade val="80000"/>
+      </a:schemeClr>
     </dgm:linClrLst>
     <dgm:effectClrLst/>
     <dgm:txLinClrLst/>
-    <dgm:txFillClrLst/>
+    <dgm:txFillClrLst meth="repeat">
+      <a:schemeClr val="dk1"/>
+    </dgm:txFillClrLst>
     <dgm:txEffectClrLst/>
   </dgm:styleLbl>
-  <dgm:styleLbl name="asst2">
+  <dgm:styleLbl name="fgImgPlace1">
     <dgm:fillClrLst meth="repeat">
-      <a:schemeClr val="accent1"/>
-    </dgm:fillClrLst>
-    <dgm:linClrLst meth="repeat">
-      <a:schemeClr val="lt1"/>
-    </dgm:linClrLst>
-    <dgm:effectClrLst/>
-    <dgm:txLinClrLst/>
-    <dgm:txFillClrLst/>
-    <dgm:txEffectClrLst/>
-  </dgm:styleLbl>
-  <dgm:styleLbl name="asst3">
-    <dgm:fillClrLst meth="repeat">
-      <a:schemeClr val="accent1"/>
-    </dgm:fillClrLst>
-    <dgm:linClrLst meth="repeat">
-      <a:schemeClr val="lt1"/>
-    </dgm:linClrLst>
-    <dgm:effectClrLst/>
-    <dgm:txLinClrLst/>
-    <dgm:txFillClrLst/>
-    <dgm:txEffectClrLst/>
-  </dgm:styleLbl>
-  <dgm:styleLbl name="asst4">
-    <dgm:fillClrLst meth="repeat">
-      <a:schemeClr val="accent1"/>
-    </dgm:fillClrLst>
-    <dgm:linClrLst meth="repeat">
-      <a:schemeClr val="lt1"/>
-    </dgm:linClrLst>
-    <dgm:effectClrLst/>
-    <dgm:txLinClrLst/>
-    <dgm:txFillClrLst/>
-    <dgm:txEffectClrLst/>
-  </dgm:styleLbl>
-  <dgm:styleLbl name="parChTrans2D1">
-    <dgm:fillClrLst meth="repeat">
-      <a:schemeClr val="accent1">
-        <a:tint val="60000"/>
+      <a:schemeClr val="dk1">
+        <a:tint val="40000"/>
       </a:schemeClr>
     </dgm:fillClrLst>
     <dgm:linClrLst meth="repeat">
-      <a:schemeClr val="accent1">
-        <a:tint val="60000"/>
+      <a:schemeClr val="dk1">
+        <a:shade val="80000"/>
       </a:schemeClr>
     </dgm:linClrLst>
     <dgm:effectClrLst/>
@@ -3529,12 +3470,16 @@
     </dgm:txFillClrLst>
     <dgm:txEffectClrLst/>
   </dgm:styleLbl>
-  <dgm:styleLbl name="parChTrans2D2">
+  <dgm:styleLbl name="alignImgPlace1">
     <dgm:fillClrLst meth="repeat">
-      <a:schemeClr val="accent1"/>
+      <a:schemeClr val="dk1">
+        <a:tint val="40000"/>
+      </a:schemeClr>
     </dgm:fillClrLst>
     <dgm:linClrLst meth="repeat">
-      <a:schemeClr val="accent1"/>
+      <a:schemeClr val="dk1">
+        <a:shade val="80000"/>
+      </a:schemeClr>
     </dgm:linClrLst>
     <dgm:effectClrLst/>
     <dgm:txLinClrLst/>
@@ -3543,12 +3488,16 @@
     </dgm:txFillClrLst>
     <dgm:txEffectClrLst/>
   </dgm:styleLbl>
-  <dgm:styleLbl name="parChTrans2D3">
+  <dgm:styleLbl name="bgImgPlace1">
     <dgm:fillClrLst meth="repeat">
-      <a:schemeClr val="accent1"/>
+      <a:schemeClr val="dk1">
+        <a:tint val="40000"/>
+      </a:schemeClr>
     </dgm:fillClrLst>
     <dgm:linClrLst meth="repeat">
-      <a:schemeClr val="accent1"/>
+      <a:schemeClr val="dk1">
+        <a:shade val="80000"/>
+      </a:schemeClr>
     </dgm:linClrLst>
     <dgm:effectClrLst/>
     <dgm:txLinClrLst/>
@@ -3557,12 +3506,214 @@
     </dgm:txFillClrLst>
     <dgm:txEffectClrLst/>
   </dgm:styleLbl>
+  <dgm:styleLbl name="sibTrans2D1">
+    <dgm:fillClrLst meth="repeat">
+      <a:schemeClr val="dk1">
+        <a:tint val="60000"/>
+      </a:schemeClr>
+    </dgm:fillClrLst>
+    <dgm:linClrLst meth="repeat">
+      <a:schemeClr val="dk1">
+        <a:tint val="60000"/>
+      </a:schemeClr>
+    </dgm:linClrLst>
+    <dgm:effectClrLst/>
+    <dgm:txLinClrLst/>
+    <dgm:txFillClrLst meth="repeat">
+      <a:schemeClr val="dk1"/>
+    </dgm:txFillClrLst>
+    <dgm:txEffectClrLst/>
+  </dgm:styleLbl>
+  <dgm:styleLbl name="fgSibTrans2D1">
+    <dgm:fillClrLst meth="repeat">
+      <a:schemeClr val="dk1">
+        <a:tint val="60000"/>
+      </a:schemeClr>
+    </dgm:fillClrLst>
+    <dgm:linClrLst meth="repeat">
+      <a:schemeClr val="dk1">
+        <a:tint val="60000"/>
+      </a:schemeClr>
+    </dgm:linClrLst>
+    <dgm:effectClrLst/>
+    <dgm:txLinClrLst/>
+    <dgm:txFillClrLst meth="repeat">
+      <a:schemeClr val="dk1"/>
+    </dgm:txFillClrLst>
+    <dgm:txEffectClrLst/>
+  </dgm:styleLbl>
+  <dgm:styleLbl name="bgSibTrans2D1">
+    <dgm:fillClrLst meth="repeat">
+      <a:schemeClr val="dk1">
+        <a:tint val="60000"/>
+      </a:schemeClr>
+    </dgm:fillClrLst>
+    <dgm:linClrLst meth="repeat">
+      <a:schemeClr val="dk1">
+        <a:tint val="60000"/>
+      </a:schemeClr>
+    </dgm:linClrLst>
+    <dgm:effectClrLst/>
+    <dgm:txLinClrLst/>
+    <dgm:txFillClrLst meth="repeat">
+      <a:schemeClr val="dk1"/>
+    </dgm:txFillClrLst>
+    <dgm:txEffectClrLst/>
+  </dgm:styleLbl>
+  <dgm:styleLbl name="sibTrans1D1">
+    <dgm:fillClrLst meth="repeat">
+      <a:schemeClr val="dk1"/>
+    </dgm:fillClrLst>
+    <dgm:linClrLst meth="repeat">
+      <a:schemeClr val="dk1"/>
+    </dgm:linClrLst>
+    <dgm:effectClrLst/>
+    <dgm:txLinClrLst/>
+    <dgm:txFillClrLst meth="repeat">
+      <a:schemeClr val="tx1"/>
+    </dgm:txFillClrLst>
+    <dgm:txEffectClrLst/>
+  </dgm:styleLbl>
+  <dgm:styleLbl name="callout">
+    <dgm:fillClrLst meth="repeat">
+      <a:schemeClr val="dk1"/>
+    </dgm:fillClrLst>
+    <dgm:linClrLst meth="repeat">
+      <a:schemeClr val="dk1"/>
+    </dgm:linClrLst>
+    <dgm:effectClrLst/>
+    <dgm:txLinClrLst/>
+    <dgm:txFillClrLst meth="repeat">
+      <a:schemeClr val="tx1"/>
+    </dgm:txFillClrLst>
+    <dgm:txEffectClrLst/>
+  </dgm:styleLbl>
+  <dgm:styleLbl name="asst0">
+    <dgm:fillClrLst meth="repeat">
+      <a:schemeClr val="lt1"/>
+    </dgm:fillClrLst>
+    <dgm:linClrLst meth="repeat">
+      <a:schemeClr val="dk1">
+        <a:shade val="80000"/>
+      </a:schemeClr>
+    </dgm:linClrLst>
+    <dgm:effectClrLst/>
+    <dgm:txLinClrLst/>
+    <dgm:txFillClrLst meth="repeat">
+      <a:schemeClr val="dk1"/>
+    </dgm:txFillClrLst>
+    <dgm:txEffectClrLst/>
+  </dgm:styleLbl>
+  <dgm:styleLbl name="asst1">
+    <dgm:fillClrLst meth="repeat">
+      <a:schemeClr val="lt1"/>
+    </dgm:fillClrLst>
+    <dgm:linClrLst meth="repeat">
+      <a:schemeClr val="dk1">
+        <a:shade val="80000"/>
+      </a:schemeClr>
+    </dgm:linClrLst>
+    <dgm:effectClrLst/>
+    <dgm:txLinClrLst/>
+    <dgm:txFillClrLst meth="repeat">
+      <a:schemeClr val="dk1"/>
+    </dgm:txFillClrLst>
+    <dgm:txEffectClrLst/>
+  </dgm:styleLbl>
+  <dgm:styleLbl name="asst2">
+    <dgm:fillClrLst meth="repeat">
+      <a:schemeClr val="lt1"/>
+    </dgm:fillClrLst>
+    <dgm:linClrLst meth="repeat">
+      <a:schemeClr val="dk1">
+        <a:shade val="80000"/>
+      </a:schemeClr>
+    </dgm:linClrLst>
+    <dgm:effectClrLst/>
+    <dgm:txLinClrLst/>
+    <dgm:txFillClrLst meth="repeat">
+      <a:schemeClr val="dk1"/>
+    </dgm:txFillClrLst>
+    <dgm:txEffectClrLst/>
+  </dgm:styleLbl>
+  <dgm:styleLbl name="asst3">
+    <dgm:fillClrLst meth="repeat">
+      <a:schemeClr val="lt1"/>
+    </dgm:fillClrLst>
+    <dgm:linClrLst meth="repeat">
+      <a:schemeClr val="dk1">
+        <a:shade val="80000"/>
+      </a:schemeClr>
+    </dgm:linClrLst>
+    <dgm:effectClrLst/>
+    <dgm:txLinClrLst/>
+    <dgm:txFillClrLst meth="repeat">
+      <a:schemeClr val="dk1"/>
+    </dgm:txFillClrLst>
+    <dgm:txEffectClrLst/>
+  </dgm:styleLbl>
+  <dgm:styleLbl name="asst4">
+    <dgm:fillClrLst meth="repeat">
+      <a:schemeClr val="lt1"/>
+    </dgm:fillClrLst>
+    <dgm:linClrLst meth="repeat">
+      <a:schemeClr val="dk1">
+        <a:shade val="80000"/>
+      </a:schemeClr>
+    </dgm:linClrLst>
+    <dgm:effectClrLst/>
+    <dgm:txLinClrLst/>
+    <dgm:txFillClrLst meth="repeat">
+      <a:schemeClr val="dk1"/>
+    </dgm:txFillClrLst>
+    <dgm:txEffectClrLst/>
+  </dgm:styleLbl>
+  <dgm:styleLbl name="parChTrans2D1">
+    <dgm:fillClrLst meth="repeat">
+      <a:schemeClr val="dk1">
+        <a:tint val="60000"/>
+      </a:schemeClr>
+    </dgm:fillClrLst>
+    <dgm:linClrLst meth="repeat">
+      <a:schemeClr val="dk1">
+        <a:tint val="60000"/>
+      </a:schemeClr>
+    </dgm:linClrLst>
+    <dgm:effectClrLst/>
+    <dgm:txLinClrLst/>
+    <dgm:txFillClrLst/>
+    <dgm:txEffectClrLst/>
+  </dgm:styleLbl>
+  <dgm:styleLbl name="parChTrans2D2">
+    <dgm:fillClrLst meth="repeat">
+      <a:schemeClr val="dk1"/>
+    </dgm:fillClrLst>
+    <dgm:linClrLst meth="repeat">
+      <a:schemeClr val="dk1"/>
+    </dgm:linClrLst>
+    <dgm:effectClrLst/>
+    <dgm:txLinClrLst/>
+    <dgm:txFillClrLst/>
+    <dgm:txEffectClrLst/>
+  </dgm:styleLbl>
+  <dgm:styleLbl name="parChTrans2D3">
+    <dgm:fillClrLst meth="repeat">
+      <a:schemeClr val="dk1"/>
+    </dgm:fillClrLst>
+    <dgm:linClrLst meth="repeat">
+      <a:schemeClr val="dk1"/>
+    </dgm:linClrLst>
+    <dgm:effectClrLst/>
+    <dgm:txLinClrLst/>
+    <dgm:txFillClrLst/>
+    <dgm:txEffectClrLst/>
+  </dgm:styleLbl>
   <dgm:styleLbl name="parChTrans2D4">
     <dgm:fillClrLst meth="repeat">
-      <a:schemeClr val="accent1"/>
+      <a:schemeClr val="dk1"/>
     </dgm:fillClrLst>
     <dgm:linClrLst meth="repeat">
-      <a:schemeClr val="accent1"/>
+      <a:schemeClr val="dk1"/>
     </dgm:linClrLst>
     <dgm:effectClrLst/>
     <dgm:txLinClrLst/>
@@ -3573,10 +3724,10 @@
   </dgm:styleLbl>
   <dgm:styleLbl name="parChTrans1D1">
     <dgm:fillClrLst meth="repeat">
-      <a:schemeClr val="accent1"/>
+      <a:schemeClr val="dk1"/>
     </dgm:fillClrLst>
     <dgm:linClrLst meth="repeat">
-      <a:schemeClr val="accent1">
+      <a:schemeClr val="dk1">
         <a:shade val="60000"/>
       </a:schemeClr>
     </dgm:linClrLst>
@@ -3589,10 +3740,10 @@
   </dgm:styleLbl>
   <dgm:styleLbl name="parChTrans1D2">
     <dgm:fillClrLst meth="repeat">
-      <a:schemeClr val="accent1"/>
+      <a:schemeClr val="dk1"/>
     </dgm:fillClrLst>
     <dgm:linClrLst meth="repeat">
-      <a:schemeClr val="accent1">
+      <a:schemeClr val="dk1">
         <a:shade val="60000"/>
       </a:schemeClr>
     </dgm:linClrLst>
@@ -3605,10 +3756,10 @@
   </dgm:styleLbl>
   <dgm:styleLbl name="parChTrans1D3">
     <dgm:fillClrLst meth="repeat">
-      <a:schemeClr val="accent1"/>
+      <a:schemeClr val="dk1"/>
     </dgm:fillClrLst>
     <dgm:linClrLst meth="repeat">
-      <a:schemeClr val="accent1">
+      <a:schemeClr val="dk1">
         <a:shade val="80000"/>
       </a:schemeClr>
     </dgm:linClrLst>
@@ -3621,10 +3772,10 @@
   </dgm:styleLbl>
   <dgm:styleLbl name="parChTrans1D4">
     <dgm:fillClrLst meth="repeat">
-      <a:schemeClr val="accent1"/>
+      <a:schemeClr val="dk1"/>
     </dgm:fillClrLst>
     <dgm:linClrLst meth="repeat">
-      <a:schemeClr val="accent1">
+      <a:schemeClr val="dk1">
         <a:shade val="80000"/>
       </a:schemeClr>
     </dgm:linClrLst>
@@ -3637,12 +3788,13 @@
   </dgm:styleLbl>
   <dgm:styleLbl name="fgAcc1">
     <dgm:fillClrLst meth="repeat">
-      <a:schemeClr val="lt1">
+      <a:schemeClr val="dk1">
         <a:alpha val="90000"/>
+        <a:tint val="40000"/>
       </a:schemeClr>
     </dgm:fillClrLst>
     <dgm:linClrLst meth="repeat">
-      <a:schemeClr val="accent1"/>
+      <a:schemeClr val="dk1"/>
     </dgm:linClrLst>
     <dgm:effectClrLst/>
     <dgm:txLinClrLst/>
@@ -3653,12 +3805,13 @@
   </dgm:styleLbl>
   <dgm:styleLbl name="conFgAcc1">
     <dgm:fillClrLst meth="repeat">
-      <a:schemeClr val="lt1">
+      <a:schemeClr val="dk1">
         <a:alpha val="90000"/>
+        <a:tint val="40000"/>
       </a:schemeClr>
     </dgm:fillClrLst>
     <dgm:linClrLst meth="repeat">
-      <a:schemeClr val="accent1"/>
+      <a:schemeClr val="dk1"/>
     </dgm:linClrLst>
     <dgm:effectClrLst/>
     <dgm:txLinClrLst/>
@@ -3669,12 +3822,13 @@
   </dgm:styleLbl>
   <dgm:styleLbl name="alignAcc1">
     <dgm:fillClrLst meth="repeat">
-      <a:schemeClr val="lt1">
+      <a:schemeClr val="dk1">
         <a:alpha val="90000"/>
+        <a:tint val="40000"/>
       </a:schemeClr>
     </dgm:fillClrLst>
     <dgm:linClrLst meth="repeat">
-      <a:schemeClr val="accent1"/>
+      <a:schemeClr val="dk1"/>
     </dgm:linClrLst>
     <dgm:effectClrLst/>
     <dgm:txLinClrLst/>
@@ -3685,12 +3839,13 @@
   </dgm:styleLbl>
   <dgm:styleLbl name="trAlignAcc1">
     <dgm:fillClrLst meth="repeat">
-      <a:schemeClr val="lt1">
+      <a:schemeClr val="dk1">
         <a:alpha val="40000"/>
+        <a:tint val="40000"/>
       </a:schemeClr>
     </dgm:fillClrLst>
     <dgm:linClrLst meth="repeat">
-      <a:schemeClr val="accent1"/>
+      <a:schemeClr val="dk1"/>
     </dgm:linClrLst>
     <dgm:effectClrLst/>
     <dgm:txLinClrLst/>
@@ -3701,12 +3856,13 @@
   </dgm:styleLbl>
   <dgm:styleLbl name="bgAcc1">
     <dgm:fillClrLst meth="repeat">
-      <a:schemeClr val="lt1">
+      <a:schemeClr val="dk1">
         <a:alpha val="90000"/>
+        <a:tint val="40000"/>
       </a:schemeClr>
     </dgm:fillClrLst>
     <dgm:linClrLst meth="repeat">
-      <a:schemeClr val="accent1"/>
+      <a:schemeClr val="dk1"/>
     </dgm:linClrLst>
     <dgm:effectClrLst/>
     <dgm:txLinClrLst/>
@@ -3720,7 +3876,7 @@
       <a:schemeClr val="lt1"/>
     </dgm:fillClrLst>
     <dgm:linClrLst meth="repeat">
-      <a:schemeClr val="accent1"/>
+      <a:schemeClr val="dk1"/>
     </dgm:linClrLst>
     <dgm:effectClrLst/>
     <dgm:txLinClrLst/>
@@ -3734,7 +3890,7 @@
       <a:schemeClr val="lt1"/>
     </dgm:fillClrLst>
     <dgm:linClrLst meth="repeat">
-      <a:schemeClr val="accent1"/>
+      <a:schemeClr val="dk1"/>
     </dgm:linClrLst>
     <dgm:effectClrLst/>
     <dgm:txLinClrLst/>
@@ -3748,7 +3904,7 @@
       <a:schemeClr val="lt1"/>
     </dgm:fillClrLst>
     <dgm:linClrLst meth="repeat">
-      <a:schemeClr val="accent1"/>
+      <a:schemeClr val="dk1"/>
     </dgm:linClrLst>
     <dgm:effectClrLst/>
     <dgm:txLinClrLst/>
@@ -3759,15 +3915,14 @@
   </dgm:styleLbl>
   <dgm:styleLbl name="fgAccFollowNode1">
     <dgm:fillClrLst meth="repeat">
-      <a:schemeClr val="accent1">
+      <a:schemeClr val="lt1">
         <a:alpha val="90000"/>
         <a:tint val="40000"/>
       </a:schemeClr>
     </dgm:fillClrLst>
     <dgm:linClrLst meth="repeat">
-      <a:schemeClr val="accent1">
+      <a:schemeClr val="dk1">
         <a:alpha val="90000"/>
-        <a:tint val="40000"/>
       </a:schemeClr>
     </dgm:linClrLst>
     <dgm:effectClrLst/>
@@ -3779,15 +3934,14 @@
   </dgm:styleLbl>
   <dgm:styleLbl name="alignAccFollowNode1">
     <dgm:fillClrLst meth="repeat">
-      <a:schemeClr val="accent1">
+      <a:schemeClr val="lt1">
         <a:alpha val="90000"/>
         <a:tint val="40000"/>
       </a:schemeClr>
     </dgm:fillClrLst>
     <dgm:linClrLst meth="repeat">
-      <a:schemeClr val="accent1">
+      <a:schemeClr val="dk1">
         <a:alpha val="90000"/>
-        <a:tint val="40000"/>
       </a:schemeClr>
     </dgm:linClrLst>
     <dgm:effectClrLst/>
@@ -3799,15 +3953,14 @@
   </dgm:styleLbl>
   <dgm:styleLbl name="bgAccFollowNode1">
     <dgm:fillClrLst meth="repeat">
-      <a:schemeClr val="accent1">
+      <a:schemeClr val="lt1">
         <a:alpha val="90000"/>
         <a:tint val="40000"/>
       </a:schemeClr>
     </dgm:fillClrLst>
     <dgm:linClrLst meth="repeat">
-      <a:schemeClr val="accent1">
+      <a:schemeClr val="dk1">
         <a:alpha val="90000"/>
-        <a:tint val="40000"/>
       </a:schemeClr>
     </dgm:linClrLst>
     <dgm:effectClrLst/>
@@ -3819,12 +3972,13 @@
   </dgm:styleLbl>
   <dgm:styleLbl name="fgAcc0">
     <dgm:fillClrLst meth="repeat">
-      <a:schemeClr val="lt1">
+      <a:schemeClr val="dk1">
         <a:alpha val="90000"/>
+        <a:tint val="40000"/>
       </a:schemeClr>
     </dgm:fillClrLst>
     <dgm:linClrLst meth="repeat">
-      <a:schemeClr val="accent1"/>
+      <a:schemeClr val="dk1"/>
     </dgm:linClrLst>
     <dgm:effectClrLst/>
     <dgm:txLinClrLst/>
@@ -3835,12 +3989,13 @@
   </dgm:styleLbl>
   <dgm:styleLbl name="fgAcc2">
     <dgm:fillClrLst meth="repeat">
-      <a:schemeClr val="lt1">
+      <a:schemeClr val="dk1">
         <a:alpha val="90000"/>
+        <a:tint val="40000"/>
       </a:schemeClr>
     </dgm:fillClrLst>
     <dgm:linClrLst meth="repeat">
-      <a:schemeClr val="accent1"/>
+      <a:schemeClr val="dk1"/>
     </dgm:linClrLst>
     <dgm:effectClrLst/>
     <dgm:txLinClrLst/>
@@ -3851,12 +4006,13 @@
   </dgm:styleLbl>
   <dgm:styleLbl name="fgAcc3">
     <dgm:fillClrLst meth="repeat">
-      <a:schemeClr val="lt1">
+      <a:schemeClr val="dk1">
         <a:alpha val="90000"/>
+        <a:tint val="40000"/>
       </a:schemeClr>
     </dgm:fillClrLst>
     <dgm:linClrLst meth="repeat">
-      <a:schemeClr val="accent1"/>
+      <a:schemeClr val="dk1"/>
     </dgm:linClrLst>
     <dgm:effectClrLst/>
     <dgm:txLinClrLst/>
@@ -3867,12 +4023,13 @@
   </dgm:styleLbl>
   <dgm:styleLbl name="fgAcc4">
     <dgm:fillClrLst meth="repeat">
-      <a:schemeClr val="lt1">
+      <a:schemeClr val="dk1">
         <a:alpha val="90000"/>
+        <a:tint val="40000"/>
       </a:schemeClr>
     </dgm:fillClrLst>
     <dgm:linClrLst meth="repeat">
-      <a:schemeClr val="accent1"/>
+      <a:schemeClr val="dk1"/>
     </dgm:linClrLst>
     <dgm:effectClrLst/>
     <dgm:txLinClrLst/>
@@ -3883,12 +4040,12 @@
   </dgm:styleLbl>
   <dgm:styleLbl name="bgShp">
     <dgm:fillClrLst meth="repeat">
-      <a:schemeClr val="accent1">
+      <a:schemeClr val="dk1">
         <a:tint val="40000"/>
       </a:schemeClr>
     </dgm:fillClrLst>
     <dgm:linClrLst meth="repeat">
-      <a:schemeClr val="accent1"/>
+      <a:schemeClr val="dk1"/>
     </dgm:linClrLst>
     <dgm:effectClrLst/>
     <dgm:txLinClrLst/>
@@ -3899,12 +4056,12 @@
   </dgm:styleLbl>
   <dgm:styleLbl name="dkBgShp">
     <dgm:fillClrLst meth="repeat">
-      <a:schemeClr val="accent1">
+      <a:schemeClr val="dk1">
         <a:shade val="80000"/>
       </a:schemeClr>
     </dgm:fillClrLst>
     <dgm:linClrLst meth="repeat">
-      <a:schemeClr val="accent1"/>
+      <a:schemeClr val="dk1"/>
     </dgm:linClrLst>
     <dgm:effectClrLst/>
     <dgm:txLinClrLst/>
@@ -3915,13 +4072,13 @@
   </dgm:styleLbl>
   <dgm:styleLbl name="trBgShp">
     <dgm:fillClrLst meth="repeat">
-      <a:schemeClr val="accent1">
+      <a:schemeClr val="dk1">
         <a:tint val="50000"/>
         <a:alpha val="40000"/>
       </a:schemeClr>
     </dgm:fillClrLst>
     <dgm:linClrLst meth="repeat">
-      <a:schemeClr val="accent1"/>
+      <a:schemeClr val="dk1"/>
     </dgm:linClrLst>
     <dgm:effectClrLst/>
     <dgm:txLinClrLst/>
@@ -3932,7 +4089,7 @@
   </dgm:styleLbl>
   <dgm:styleLbl name="fgShp">
     <dgm:fillClrLst meth="repeat">
-      <a:schemeClr val="accent1">
+      <a:schemeClr val="dk1">
         <a:tint val="60000"/>
       </a:schemeClr>
     </dgm:fillClrLst>
@@ -8068,7 +8225,7 @@
 <dgm:dataModel xmlns:dgm="http://schemas.openxmlformats.org/drawingml/2006/diagram" xmlns:a="http://schemas.openxmlformats.org/drawingml/2006/main">
   <dgm:ptLst>
     <dgm:pt modelId="{508D9315-19C3-4A8A-9FF2-65E61C9EAFD9}" type="doc">
-      <dgm:prSet loTypeId="urn:microsoft.com/office/officeart/2005/8/layout/vList3" loCatId="list" qsTypeId="urn:microsoft.com/office/officeart/2005/8/quickstyle/simple1" qsCatId="simple" csTypeId="urn:microsoft.com/office/officeart/2005/8/colors/accent1_2" csCatId="accent1" phldr="1"/>
+      <dgm:prSet loTypeId="urn:microsoft.com/office/officeart/2005/8/layout/pList2" loCatId="list" qsTypeId="urn:microsoft.com/office/officeart/2005/8/quickstyle/simple1" qsCatId="simple" csTypeId="urn:microsoft.com/office/officeart/2005/8/colors/accent0_1" csCatId="mainScheme" phldr="1"/>
       <dgm:spPr/>
       <dgm:t>
         <a:bodyPr/>
@@ -8263,8 +8420,8 @@
         </a:p>
       </dgm:t>
     </dgm:pt>
-    <dgm:pt modelId="{23F03EA6-0223-4822-83BF-1B7B21BEC8A0}" type="pres">
-      <dgm:prSet presAssocID="{508D9315-19C3-4A8A-9FF2-65E61C9EAFD9}" presName="linearFlow" presStyleCnt="0">
+    <dgm:pt modelId="{F1FE04B6-9F00-469F-B219-75D2FE1B1A38}" type="pres">
+      <dgm:prSet presAssocID="{508D9315-19C3-4A8A-9FF2-65E61C9EAFD9}" presName="Name0" presStyleCnt="0">
         <dgm:presLayoutVars>
           <dgm:dir/>
           <dgm:resizeHandles val="exact"/>
@@ -8272,134 +8429,268 @@
       </dgm:prSet>
       <dgm:spPr/>
     </dgm:pt>
-    <dgm:pt modelId="{B73EA776-7495-4B47-99C7-D32C363A749A}" type="pres">
-      <dgm:prSet presAssocID="{79BD1AF1-AD2C-44C7-A45D-0DA217EBD0EB}" presName="composite" presStyleCnt="0"/>
+    <dgm:pt modelId="{21EA317E-D01E-4268-B4A4-92DD34A6C7C8}" type="pres">
+      <dgm:prSet presAssocID="{508D9315-19C3-4A8A-9FF2-65E61C9EAFD9}" presName="bkgdShp" presStyleLbl="alignAccFollowNode1" presStyleIdx="0" presStyleCnt="1"/>
       <dgm:spPr/>
     </dgm:pt>
-    <dgm:pt modelId="{93EF77D3-8773-45CC-9CDD-1E1E1EC7D46B}" type="pres">
-      <dgm:prSet presAssocID="{79BD1AF1-AD2C-44C7-A45D-0DA217EBD0EB}" presName="imgShp" presStyleLbl="fgImgPlace1" presStyleIdx="0" presStyleCnt="5"/>
+    <dgm:pt modelId="{6195C872-2EC9-46B4-AC45-7B58F1234CB5}" type="pres">
+      <dgm:prSet presAssocID="{508D9315-19C3-4A8A-9FF2-65E61C9EAFD9}" presName="linComp" presStyleCnt="0"/>
       <dgm:spPr/>
     </dgm:pt>
-    <dgm:pt modelId="{0CEC0145-29D6-4160-B327-76E386A44003}" type="pres">
-      <dgm:prSet presAssocID="{79BD1AF1-AD2C-44C7-A45D-0DA217EBD0EB}" presName="txShp" presStyleLbl="node1" presStyleIdx="0" presStyleCnt="5">
+    <dgm:pt modelId="{4AEEA9EE-B10E-47E1-BACC-8FFACF14E782}" type="pres">
+      <dgm:prSet presAssocID="{79BD1AF1-AD2C-44C7-A45D-0DA217EBD0EB}" presName="compNode" presStyleCnt="0"/>
+      <dgm:spPr/>
+    </dgm:pt>
+    <dgm:pt modelId="{1054A012-B303-44A5-A91A-98696DAC3CFA}" type="pres">
+      <dgm:prSet presAssocID="{79BD1AF1-AD2C-44C7-A45D-0DA217EBD0EB}" presName="node" presStyleLbl="node1" presStyleIdx="0" presStyleCnt="5">
         <dgm:presLayoutVars>
           <dgm:bulletEnabled val="1"/>
         </dgm:presLayoutVars>
       </dgm:prSet>
       <dgm:spPr/>
     </dgm:pt>
-    <dgm:pt modelId="{F38C8E31-7373-409D-A4F1-CAF372BC919D}" type="pres">
-      <dgm:prSet presAssocID="{D3DDCE13-97DB-4926-820F-06CA3A3E7F32}" presName="spacing" presStyleCnt="0"/>
+    <dgm:pt modelId="{96CAE58E-FC56-4EA3-AF55-9AF85EC35B1E}" type="pres">
+      <dgm:prSet presAssocID="{79BD1AF1-AD2C-44C7-A45D-0DA217EBD0EB}" presName="invisiNode" presStyleLbl="node1" presStyleIdx="0" presStyleCnt="5"/>
       <dgm:spPr/>
     </dgm:pt>
-    <dgm:pt modelId="{7DF16E29-D995-4013-B2AF-FD8CA27AA258}" type="pres">
-      <dgm:prSet presAssocID="{8A0107CE-D299-4047-A4E6-F37412B8D479}" presName="composite" presStyleCnt="0"/>
+    <dgm:pt modelId="{770826BC-21A1-476E-BB00-FB5AB49A83A8}" type="pres">
+      <dgm:prSet presAssocID="{79BD1AF1-AD2C-44C7-A45D-0DA217EBD0EB}" presName="imagNode" presStyleLbl="fgImgPlace1" presStyleIdx="0" presStyleCnt="5"/>
+      <dgm:spPr>
+        <a:blipFill>
+          <a:blip xmlns:r="http://schemas.openxmlformats.org/officeDocument/2006/relationships" r:embed="rId1">
+            <a:extLst>
+              <a:ext uri="{96DAC541-7B7A-43D3-8B79-37D633B846F1}">
+                <asvg:svgBlip xmlns:asvg="http://schemas.microsoft.com/office/drawing/2016/SVG/main" r:embed="rId2"/>
+              </a:ext>
+            </a:extLst>
+          </a:blip>
+          <a:srcRect/>
+          <a:stretch>
+            <a:fillRect l="-25000" r="-25000"/>
+          </a:stretch>
+        </a:blipFill>
+      </dgm:spPr>
+      <dgm:extLst>
+        <a:ext uri="{E40237B7-FDA0-4F09-8148-C483321AD2D9}">
+          <dgm14:cNvPr xmlns:dgm14="http://schemas.microsoft.com/office/drawing/2010/diagram" id="0" name="" descr="Line arrow: Straight with solid fill"/>
+        </a:ext>
+      </dgm:extLst>
+    </dgm:pt>
+    <dgm:pt modelId="{B05E8B3D-1EDF-4CD3-9A03-6A2EE2AB70BC}" type="pres">
+      <dgm:prSet presAssocID="{D3DDCE13-97DB-4926-820F-06CA3A3E7F32}" presName="sibTrans" presStyleLbl="sibTrans2D1" presStyleIdx="0" presStyleCnt="0"/>
       <dgm:spPr/>
     </dgm:pt>
-    <dgm:pt modelId="{2DDBA050-660C-4511-89D8-87B11F957810}" type="pres">
-      <dgm:prSet presAssocID="{8A0107CE-D299-4047-A4E6-F37412B8D479}" presName="imgShp" presStyleLbl="fgImgPlace1" presStyleIdx="1" presStyleCnt="5"/>
+    <dgm:pt modelId="{5B9B635E-5550-4947-AA31-5F3E4A4CEA7B}" type="pres">
+      <dgm:prSet presAssocID="{8A0107CE-D299-4047-A4E6-F37412B8D479}" presName="compNode" presStyleCnt="0"/>
       <dgm:spPr/>
     </dgm:pt>
-    <dgm:pt modelId="{277D4B6D-CD34-4BB2-8CCE-921B7BE9DDF7}" type="pres">
-      <dgm:prSet presAssocID="{8A0107CE-D299-4047-A4E6-F37412B8D479}" presName="txShp" presStyleLbl="node1" presStyleIdx="1" presStyleCnt="5">
+    <dgm:pt modelId="{565CF413-4EA1-4058-BE15-31A204272AF1}" type="pres">
+      <dgm:prSet presAssocID="{8A0107CE-D299-4047-A4E6-F37412B8D479}" presName="node" presStyleLbl="node1" presStyleIdx="1" presStyleCnt="5">
         <dgm:presLayoutVars>
           <dgm:bulletEnabled val="1"/>
         </dgm:presLayoutVars>
       </dgm:prSet>
       <dgm:spPr/>
     </dgm:pt>
-    <dgm:pt modelId="{F12E449E-BD01-4479-81D5-10062C30BBE0}" type="pres">
-      <dgm:prSet presAssocID="{EA19D553-2732-41B0-8E94-E006A6387682}" presName="spacing" presStyleCnt="0"/>
+    <dgm:pt modelId="{843F8169-F7CE-4579-BE9B-F15233D753B1}" type="pres">
+      <dgm:prSet presAssocID="{8A0107CE-D299-4047-A4E6-F37412B8D479}" presName="invisiNode" presStyleLbl="node1" presStyleIdx="1" presStyleCnt="5"/>
       <dgm:spPr/>
     </dgm:pt>
-    <dgm:pt modelId="{CCA28844-FBDD-4653-9E29-B8E13F5AFBAB}" type="pres">
-      <dgm:prSet presAssocID="{49A7A6A2-486F-477A-A582-2E9EBA2196EE}" presName="composite" presStyleCnt="0"/>
+    <dgm:pt modelId="{049DD801-0F61-4C16-BA38-FD0A1B329717}" type="pres">
+      <dgm:prSet presAssocID="{8A0107CE-D299-4047-A4E6-F37412B8D479}" presName="imagNode" presStyleLbl="fgImgPlace1" presStyleIdx="1" presStyleCnt="5"/>
+      <dgm:spPr>
+        <a:blipFill>
+          <a:blip xmlns:r="http://schemas.openxmlformats.org/officeDocument/2006/relationships" r:embed="rId3">
+            <a:extLst>
+              <a:ext uri="{96DAC541-7B7A-43D3-8B79-37D633B846F1}">
+                <asvg:svgBlip xmlns:asvg="http://schemas.microsoft.com/office/drawing/2016/SVG/main" r:embed="rId4"/>
+              </a:ext>
+            </a:extLst>
+          </a:blip>
+          <a:srcRect/>
+          <a:stretch>
+            <a:fillRect l="-25000" r="-25000"/>
+          </a:stretch>
+        </a:blipFill>
+      </dgm:spPr>
+      <dgm:extLst>
+        <a:ext uri="{E40237B7-FDA0-4F09-8148-C483321AD2D9}">
+          <dgm14:cNvPr xmlns:dgm14="http://schemas.microsoft.com/office/drawing/2010/diagram" id="0" name="" descr="Arrow Right with solid fill"/>
+        </a:ext>
+      </dgm:extLst>
+    </dgm:pt>
+    <dgm:pt modelId="{656494F1-6F7F-46F6-B7CC-E7159AED2B17}" type="pres">
+      <dgm:prSet presAssocID="{EA19D553-2732-41B0-8E94-E006A6387682}" presName="sibTrans" presStyleLbl="sibTrans2D1" presStyleIdx="0" presStyleCnt="0"/>
       <dgm:spPr/>
     </dgm:pt>
-    <dgm:pt modelId="{791087E5-0241-4C09-B2B5-4716C8A4BDF7}" type="pres">
-      <dgm:prSet presAssocID="{49A7A6A2-486F-477A-A582-2E9EBA2196EE}" presName="imgShp" presStyleLbl="fgImgPlace1" presStyleIdx="2" presStyleCnt="5"/>
+    <dgm:pt modelId="{493225D2-D647-412C-959B-6912CC6D3729}" type="pres">
+      <dgm:prSet presAssocID="{49A7A6A2-486F-477A-A582-2E9EBA2196EE}" presName="compNode" presStyleCnt="0"/>
       <dgm:spPr/>
     </dgm:pt>
-    <dgm:pt modelId="{E49705B8-EB53-4A66-95D7-148C862C4AAE}" type="pres">
-      <dgm:prSet presAssocID="{49A7A6A2-486F-477A-A582-2E9EBA2196EE}" presName="txShp" presStyleLbl="node1" presStyleIdx="2" presStyleCnt="5">
+    <dgm:pt modelId="{305E261B-2391-46CE-B7B3-E5FE4A1FA948}" type="pres">
+      <dgm:prSet presAssocID="{49A7A6A2-486F-477A-A582-2E9EBA2196EE}" presName="node" presStyleLbl="node1" presStyleIdx="2" presStyleCnt="5">
         <dgm:presLayoutVars>
           <dgm:bulletEnabled val="1"/>
         </dgm:presLayoutVars>
       </dgm:prSet>
       <dgm:spPr/>
     </dgm:pt>
-    <dgm:pt modelId="{2152ECF2-DA0C-427A-A4C4-D6768C661148}" type="pres">
-      <dgm:prSet presAssocID="{DDD2109E-AA58-44A7-87D2-E0D6E7A18BBB}" presName="spacing" presStyleCnt="0"/>
+    <dgm:pt modelId="{C79D7441-2EBF-40D1-A7E4-7C9FA9D5BF7F}" type="pres">
+      <dgm:prSet presAssocID="{49A7A6A2-486F-477A-A582-2E9EBA2196EE}" presName="invisiNode" presStyleLbl="node1" presStyleIdx="2" presStyleCnt="5"/>
       <dgm:spPr/>
     </dgm:pt>
-    <dgm:pt modelId="{D1C10A06-0B17-4EDE-A916-0CC3E17FAFB1}" type="pres">
-      <dgm:prSet presAssocID="{F7E2A730-6067-445D-AE17-F2B3DF5BA0C1}" presName="composite" presStyleCnt="0"/>
+    <dgm:pt modelId="{DEAE018B-5D85-4E56-B256-6E44022F6931}" type="pres">
+      <dgm:prSet presAssocID="{49A7A6A2-486F-477A-A582-2E9EBA2196EE}" presName="imagNode" presStyleLbl="fgImgPlace1" presStyleIdx="2" presStyleCnt="5"/>
+      <dgm:spPr>
+        <a:blipFill>
+          <a:blip xmlns:r="http://schemas.openxmlformats.org/officeDocument/2006/relationships" r:embed="rId5">
+            <a:extLst>
+              <a:ext uri="{96DAC541-7B7A-43D3-8B79-37D633B846F1}">
+                <asvg:svgBlip xmlns:asvg="http://schemas.microsoft.com/office/drawing/2016/SVG/main" r:embed="rId6"/>
+              </a:ext>
+            </a:extLst>
+          </a:blip>
+          <a:srcRect/>
+          <a:stretch>
+            <a:fillRect l="-25000" r="-25000"/>
+          </a:stretch>
+        </a:blipFill>
+      </dgm:spPr>
+      <dgm:extLst>
+        <a:ext uri="{E40237B7-FDA0-4F09-8148-C483321AD2D9}">
+          <dgm14:cNvPr xmlns:dgm14="http://schemas.microsoft.com/office/drawing/2010/diagram" id="0" name="" descr="Arrow Up with solid fill"/>
+        </a:ext>
+      </dgm:extLst>
+    </dgm:pt>
+    <dgm:pt modelId="{C24C0567-A48B-4416-A195-46F0F938DF03}" type="pres">
+      <dgm:prSet presAssocID="{DDD2109E-AA58-44A7-87D2-E0D6E7A18BBB}" presName="sibTrans" presStyleLbl="sibTrans2D1" presStyleIdx="0" presStyleCnt="0"/>
       <dgm:spPr/>
     </dgm:pt>
-    <dgm:pt modelId="{B1561EA5-98E9-420E-AE26-23966A9AB9C2}" type="pres">
-      <dgm:prSet presAssocID="{F7E2A730-6067-445D-AE17-F2B3DF5BA0C1}" presName="imgShp" presStyleLbl="fgImgPlace1" presStyleIdx="3" presStyleCnt="5"/>
+    <dgm:pt modelId="{32564428-1D92-4113-81EB-FEA91894CFDF}" type="pres">
+      <dgm:prSet presAssocID="{F7E2A730-6067-445D-AE17-F2B3DF5BA0C1}" presName="compNode" presStyleCnt="0"/>
       <dgm:spPr/>
     </dgm:pt>
-    <dgm:pt modelId="{800E258C-A1D8-4B63-B183-83BF76F88040}" type="pres">
-      <dgm:prSet presAssocID="{F7E2A730-6067-445D-AE17-F2B3DF5BA0C1}" presName="txShp" presStyleLbl="node1" presStyleIdx="3" presStyleCnt="5">
+    <dgm:pt modelId="{D5379EFD-0EE0-4C90-AD20-FD25A764BDEB}" type="pres">
+      <dgm:prSet presAssocID="{F7E2A730-6067-445D-AE17-F2B3DF5BA0C1}" presName="node" presStyleLbl="node1" presStyleIdx="3" presStyleCnt="5">
         <dgm:presLayoutVars>
           <dgm:bulletEnabled val="1"/>
         </dgm:presLayoutVars>
       </dgm:prSet>
       <dgm:spPr/>
     </dgm:pt>
-    <dgm:pt modelId="{E7D55E0A-FA39-46E7-828A-85BADEAD5A6B}" type="pres">
-      <dgm:prSet presAssocID="{80FF30E9-47C2-41B2-9DFA-7FCF526F629E}" presName="spacing" presStyleCnt="0"/>
+    <dgm:pt modelId="{C716B2DF-A60A-41FD-B3A8-6C19EC7D00D4}" type="pres">
+      <dgm:prSet presAssocID="{F7E2A730-6067-445D-AE17-F2B3DF5BA0C1}" presName="invisiNode" presStyleLbl="node1" presStyleIdx="3" presStyleCnt="5"/>
       <dgm:spPr/>
     </dgm:pt>
-    <dgm:pt modelId="{9B39FE8C-1945-49A3-8C1B-C925224B64CB}" type="pres">
-      <dgm:prSet presAssocID="{7009C747-B498-4A54-8526-5DA1E90C0BF5}" presName="composite" presStyleCnt="0"/>
+    <dgm:pt modelId="{91DD16FE-2974-499F-8186-7B0D3F4A2548}" type="pres">
+      <dgm:prSet presAssocID="{F7E2A730-6067-445D-AE17-F2B3DF5BA0C1}" presName="imagNode" presStyleLbl="fgImgPlace1" presStyleIdx="3" presStyleCnt="5"/>
+      <dgm:spPr>
+        <a:blipFill>
+          <a:blip xmlns:r="http://schemas.openxmlformats.org/officeDocument/2006/relationships" r:embed="rId7">
+            <a:extLst>
+              <a:ext uri="{96DAC541-7B7A-43D3-8B79-37D633B846F1}">
+                <asvg:svgBlip xmlns:asvg="http://schemas.microsoft.com/office/drawing/2016/SVG/main" r:embed="rId8"/>
+              </a:ext>
+            </a:extLst>
+          </a:blip>
+          <a:srcRect/>
+          <a:stretch>
+            <a:fillRect l="-25000" r="-25000"/>
+          </a:stretch>
+        </a:blipFill>
+      </dgm:spPr>
+      <dgm:extLst>
+        <a:ext uri="{E40237B7-FDA0-4F09-8148-C483321AD2D9}">
+          <dgm14:cNvPr xmlns:dgm14="http://schemas.microsoft.com/office/drawing/2010/diagram" id="0" name="" descr="Arrow Down with solid fill"/>
+        </a:ext>
+      </dgm:extLst>
+    </dgm:pt>
+    <dgm:pt modelId="{FD8A13AC-E1B1-4BE0-AEA5-87651258B8B2}" type="pres">
+      <dgm:prSet presAssocID="{80FF30E9-47C2-41B2-9DFA-7FCF526F629E}" presName="sibTrans" presStyleLbl="sibTrans2D1" presStyleIdx="0" presStyleCnt="0"/>
       <dgm:spPr/>
     </dgm:pt>
-    <dgm:pt modelId="{F354D0C9-6866-48AA-9EF6-E41CE9A8E223}" type="pres">
-      <dgm:prSet presAssocID="{7009C747-B498-4A54-8526-5DA1E90C0BF5}" presName="imgShp" presStyleLbl="fgImgPlace1" presStyleIdx="4" presStyleCnt="5"/>
+    <dgm:pt modelId="{29447E9B-1105-41AB-941B-139832A66801}" type="pres">
+      <dgm:prSet presAssocID="{7009C747-B498-4A54-8526-5DA1E90C0BF5}" presName="compNode" presStyleCnt="0"/>
       <dgm:spPr/>
     </dgm:pt>
-    <dgm:pt modelId="{17EDDBAA-6699-4477-B1EB-11327F10C386}" type="pres">
-      <dgm:prSet presAssocID="{7009C747-B498-4A54-8526-5DA1E90C0BF5}" presName="txShp" presStyleLbl="node1" presStyleIdx="4" presStyleCnt="5">
+    <dgm:pt modelId="{4434AB10-3B68-4F9B-B896-16A6FA197A3E}" type="pres">
+      <dgm:prSet presAssocID="{7009C747-B498-4A54-8526-5DA1E90C0BF5}" presName="node" presStyleLbl="node1" presStyleIdx="4" presStyleCnt="5">
         <dgm:presLayoutVars>
           <dgm:bulletEnabled val="1"/>
         </dgm:presLayoutVars>
       </dgm:prSet>
       <dgm:spPr/>
     </dgm:pt>
+    <dgm:pt modelId="{A6190390-FB52-4E9D-8080-65CD6BCD3176}" type="pres">
+      <dgm:prSet presAssocID="{7009C747-B498-4A54-8526-5DA1E90C0BF5}" presName="invisiNode" presStyleLbl="node1" presStyleIdx="4" presStyleCnt="5"/>
+      <dgm:spPr/>
+    </dgm:pt>
+    <dgm:pt modelId="{C734EF36-49E4-4C41-B890-1C8E75570946}" type="pres">
+      <dgm:prSet presAssocID="{7009C747-B498-4A54-8526-5DA1E90C0BF5}" presName="imagNode" presStyleLbl="fgImgPlace1" presStyleIdx="4" presStyleCnt="5"/>
+      <dgm:spPr>
+        <a:blipFill>
+          <a:blip xmlns:r="http://schemas.openxmlformats.org/officeDocument/2006/relationships" r:embed="rId9">
+            <a:extLst>
+              <a:ext uri="{96DAC541-7B7A-43D3-8B79-37D633B846F1}">
+                <asvg:svgBlip xmlns:asvg="http://schemas.microsoft.com/office/drawing/2016/SVG/main" r:embed="rId10"/>
+              </a:ext>
+            </a:extLst>
+          </a:blip>
+          <a:srcRect/>
+          <a:stretch>
+            <a:fillRect t="-22000" b="-22000"/>
+          </a:stretch>
+        </a:blipFill>
+      </dgm:spPr>
+      <dgm:extLst>
+        <a:ext uri="{E40237B7-FDA0-4F09-8148-C483321AD2D9}">
+          <dgm14:cNvPr xmlns:dgm14="http://schemas.microsoft.com/office/drawing/2010/diagram" id="0" name="" descr="Harvey Balls 100% with solid fill"/>
+        </a:ext>
+      </dgm:extLst>
+    </dgm:pt>
   </dgm:ptLst>
   <dgm:cxnLst>
-    <dgm:cxn modelId="{2A128F08-8184-45C3-8380-836FCE02792E}" type="presOf" srcId="{8A0107CE-D299-4047-A4E6-F37412B8D479}" destId="{277D4B6D-CD34-4BB2-8CCE-921B7BE9DDF7}" srcOrd="0" destOrd="0" presId="urn:microsoft.com/office/officeart/2005/8/layout/vList3"/>
-    <dgm:cxn modelId="{B8C3910D-5A24-4A6D-BA3D-6C445A334637}" type="presOf" srcId="{508D9315-19C3-4A8A-9FF2-65E61C9EAFD9}" destId="{23F03EA6-0223-4822-83BF-1B7B21BEC8A0}" srcOrd="0" destOrd="0" presId="urn:microsoft.com/office/officeart/2005/8/layout/vList3"/>
-    <dgm:cxn modelId="{FA3D1C0E-D31D-4F16-9048-26690ECBDDB1}" type="presOf" srcId="{79BD1AF1-AD2C-44C7-A45D-0DA217EBD0EB}" destId="{0CEC0145-29D6-4160-B327-76E386A44003}" srcOrd="0" destOrd="0" presId="urn:microsoft.com/office/officeart/2005/8/layout/vList3"/>
+    <dgm:cxn modelId="{B4062E09-255F-4C4C-A0F4-ED583270254C}" type="presOf" srcId="{49A7A6A2-486F-477A-A582-2E9EBA2196EE}" destId="{305E261B-2391-46CE-B7B3-E5FE4A1FA948}" srcOrd="0" destOrd="0" presId="urn:microsoft.com/office/officeart/2005/8/layout/pList2"/>
+    <dgm:cxn modelId="{DD95461B-2DCD-4FF2-BA89-23F17179E56C}" type="presOf" srcId="{79BD1AF1-AD2C-44C7-A45D-0DA217EBD0EB}" destId="{1054A012-B303-44A5-A91A-98696DAC3CFA}" srcOrd="0" destOrd="0" presId="urn:microsoft.com/office/officeart/2005/8/layout/pList2"/>
+    <dgm:cxn modelId="{0960DC1B-FCC6-41A6-B702-7D909D5FEB83}" type="presOf" srcId="{DDD2109E-AA58-44A7-87D2-E0D6E7A18BBB}" destId="{C24C0567-A48B-4416-A195-46F0F938DF03}" srcOrd="0" destOrd="0" presId="urn:microsoft.com/office/officeart/2005/8/layout/pList2"/>
+    <dgm:cxn modelId="{C7DBC31E-4623-4E46-8F0B-6D44376CD806}" type="presOf" srcId="{D3DDCE13-97DB-4926-820F-06CA3A3E7F32}" destId="{B05E8B3D-1EDF-4CD3-9A03-6A2EE2AB70BC}" srcOrd="0" destOrd="0" presId="urn:microsoft.com/office/officeart/2005/8/layout/pList2"/>
+    <dgm:cxn modelId="{001CCB22-096A-4D74-A51E-245895545BA9}" type="presOf" srcId="{80FF30E9-47C2-41B2-9DFA-7FCF526F629E}" destId="{FD8A13AC-E1B1-4BE0-AEA5-87651258B8B2}" srcOrd="0" destOrd="0" presId="urn:microsoft.com/office/officeart/2005/8/layout/pList2"/>
     <dgm:cxn modelId="{3B386B3E-386F-4DFC-842E-DAE4774CC931}" srcId="{508D9315-19C3-4A8A-9FF2-65E61C9EAFD9}" destId="{79BD1AF1-AD2C-44C7-A45D-0DA217EBD0EB}" srcOrd="0" destOrd="0" parTransId="{756788B6-0242-4019-81E7-E4BA63D8EB44}" sibTransId="{D3DDCE13-97DB-4926-820F-06CA3A3E7F32}"/>
+    <dgm:cxn modelId="{FFBD6565-12DD-462E-8223-DC961C349ABE}" type="presOf" srcId="{7009C747-B498-4A54-8526-5DA1E90C0BF5}" destId="{4434AB10-3B68-4F9B-B896-16A6FA197A3E}" srcOrd="0" destOrd="0" presId="urn:microsoft.com/office/officeart/2005/8/layout/pList2"/>
     <dgm:cxn modelId="{D1D70966-3E6E-4846-AB8F-9E88490D102F}" srcId="{508D9315-19C3-4A8A-9FF2-65E61C9EAFD9}" destId="{49A7A6A2-486F-477A-A582-2E9EBA2196EE}" srcOrd="2" destOrd="0" parTransId="{34CD9171-B47B-4A9C-83BF-F219A92684A4}" sibTransId="{DDD2109E-AA58-44A7-87D2-E0D6E7A18BBB}"/>
-    <dgm:cxn modelId="{8F7FEF68-A7B4-4B48-A952-04D1AEBA43F4}" type="presOf" srcId="{7009C747-B498-4A54-8526-5DA1E90C0BF5}" destId="{17EDDBAA-6699-4477-B1EB-11327F10C386}" srcOrd="0" destOrd="0" presId="urn:microsoft.com/office/officeart/2005/8/layout/vList3"/>
+    <dgm:cxn modelId="{CF588C66-2E4B-4FA0-A1FB-C12C5F327314}" type="presOf" srcId="{F7E2A730-6067-445D-AE17-F2B3DF5BA0C1}" destId="{D5379EFD-0EE0-4C90-AD20-FD25A764BDEB}" srcOrd="0" destOrd="0" presId="urn:microsoft.com/office/officeart/2005/8/layout/pList2"/>
+    <dgm:cxn modelId="{B817CF54-F730-47CC-A899-9349CD35BB49}" type="presOf" srcId="{8A0107CE-D299-4047-A4E6-F37412B8D479}" destId="{565CF413-4EA1-4058-BE15-31A204272AF1}" srcOrd="0" destOrd="0" presId="urn:microsoft.com/office/officeart/2005/8/layout/pList2"/>
+    <dgm:cxn modelId="{8CC1B176-42A2-49F7-B6BB-9103E39949AA}" type="presOf" srcId="{508D9315-19C3-4A8A-9FF2-65E61C9EAFD9}" destId="{F1FE04B6-9F00-469F-B219-75D2FE1B1A38}" srcOrd="0" destOrd="0" presId="urn:microsoft.com/office/officeart/2005/8/layout/pList2"/>
     <dgm:cxn modelId="{F953C177-D4B3-40DB-8D76-34987E6D828B}" srcId="{508D9315-19C3-4A8A-9FF2-65E61C9EAFD9}" destId="{F7E2A730-6067-445D-AE17-F2B3DF5BA0C1}" srcOrd="3" destOrd="0" parTransId="{58865B57-78B7-4576-AB4F-88AA09AF64F8}" sibTransId="{80FF30E9-47C2-41B2-9DFA-7FCF526F629E}"/>
     <dgm:cxn modelId="{50642D80-048D-495D-B321-225A555F5918}" srcId="{508D9315-19C3-4A8A-9FF2-65E61C9EAFD9}" destId="{8A0107CE-D299-4047-A4E6-F37412B8D479}" srcOrd="1" destOrd="0" parTransId="{35A91F65-6448-4961-A67C-77EDD489DB41}" sibTransId="{EA19D553-2732-41B0-8E94-E006A6387682}"/>
-    <dgm:cxn modelId="{E5F1DBAA-58FB-41B4-AC4F-285B7C5EB23C}" type="presOf" srcId="{F7E2A730-6067-445D-AE17-F2B3DF5BA0C1}" destId="{800E258C-A1D8-4B63-B183-83BF76F88040}" srcOrd="0" destOrd="0" presId="urn:microsoft.com/office/officeart/2005/8/layout/vList3"/>
     <dgm:cxn modelId="{ACB5B4B1-7C42-40E0-B7F0-3216B45B0A57}" srcId="{508D9315-19C3-4A8A-9FF2-65E61C9EAFD9}" destId="{7009C747-B498-4A54-8526-5DA1E90C0BF5}" srcOrd="4" destOrd="0" parTransId="{3BECFEAF-1F7D-4E43-877A-182DF46824BB}" sibTransId="{A1742FDF-9C22-480E-BA15-2FA19BC68CA1}"/>
-    <dgm:cxn modelId="{51049ED3-93A0-42E7-B388-4BDD0183F4BC}" type="presOf" srcId="{49A7A6A2-486F-477A-A582-2E9EBA2196EE}" destId="{E49705B8-EB53-4A66-95D7-148C862C4AAE}" srcOrd="0" destOrd="0" presId="urn:microsoft.com/office/officeart/2005/8/layout/vList3"/>
-    <dgm:cxn modelId="{F23F879B-4737-4000-ADAF-27D33680286E}" type="presParOf" srcId="{23F03EA6-0223-4822-83BF-1B7B21BEC8A0}" destId="{B73EA776-7495-4B47-99C7-D32C363A749A}" srcOrd="0" destOrd="0" presId="urn:microsoft.com/office/officeart/2005/8/layout/vList3"/>
-    <dgm:cxn modelId="{583DB416-7DC5-4681-9742-E7E78BA7A659}" type="presParOf" srcId="{B73EA776-7495-4B47-99C7-D32C363A749A}" destId="{93EF77D3-8773-45CC-9CDD-1E1E1EC7D46B}" srcOrd="0" destOrd="0" presId="urn:microsoft.com/office/officeart/2005/8/layout/vList3"/>
-    <dgm:cxn modelId="{EA35CB99-3A76-4DA7-8975-882BCD3437A9}" type="presParOf" srcId="{B73EA776-7495-4B47-99C7-D32C363A749A}" destId="{0CEC0145-29D6-4160-B327-76E386A44003}" srcOrd="1" destOrd="0" presId="urn:microsoft.com/office/officeart/2005/8/layout/vList3"/>
-    <dgm:cxn modelId="{12A91BE7-DF09-4A89-8981-04FA9874BC9B}" type="presParOf" srcId="{23F03EA6-0223-4822-83BF-1B7B21BEC8A0}" destId="{F38C8E31-7373-409D-A4F1-CAF372BC919D}" srcOrd="1" destOrd="0" presId="urn:microsoft.com/office/officeart/2005/8/layout/vList3"/>
-    <dgm:cxn modelId="{8F78E683-CDCB-4076-BEDA-0A6DBF9BE3C2}" type="presParOf" srcId="{23F03EA6-0223-4822-83BF-1B7B21BEC8A0}" destId="{7DF16E29-D995-4013-B2AF-FD8CA27AA258}" srcOrd="2" destOrd="0" presId="urn:microsoft.com/office/officeart/2005/8/layout/vList3"/>
-    <dgm:cxn modelId="{C3766D3F-B76C-4FDF-A31F-4ED3BA5DEC29}" type="presParOf" srcId="{7DF16E29-D995-4013-B2AF-FD8CA27AA258}" destId="{2DDBA050-660C-4511-89D8-87B11F957810}" srcOrd="0" destOrd="0" presId="urn:microsoft.com/office/officeart/2005/8/layout/vList3"/>
-    <dgm:cxn modelId="{985116A1-9C4B-4C5D-BD52-3706448E8399}" type="presParOf" srcId="{7DF16E29-D995-4013-B2AF-FD8CA27AA258}" destId="{277D4B6D-CD34-4BB2-8CCE-921B7BE9DDF7}" srcOrd="1" destOrd="0" presId="urn:microsoft.com/office/officeart/2005/8/layout/vList3"/>
-    <dgm:cxn modelId="{6FF10EAF-74FC-40A2-B576-E4DE8144D438}" type="presParOf" srcId="{23F03EA6-0223-4822-83BF-1B7B21BEC8A0}" destId="{F12E449E-BD01-4479-81D5-10062C30BBE0}" srcOrd="3" destOrd="0" presId="urn:microsoft.com/office/officeart/2005/8/layout/vList3"/>
-    <dgm:cxn modelId="{6149F3FA-DD84-4338-AE08-A0E81C47A618}" type="presParOf" srcId="{23F03EA6-0223-4822-83BF-1B7B21BEC8A0}" destId="{CCA28844-FBDD-4653-9E29-B8E13F5AFBAB}" srcOrd="4" destOrd="0" presId="urn:microsoft.com/office/officeart/2005/8/layout/vList3"/>
-    <dgm:cxn modelId="{89BE49BB-C34D-48A5-BECF-AFE7A4A1FCFC}" type="presParOf" srcId="{CCA28844-FBDD-4653-9E29-B8E13F5AFBAB}" destId="{791087E5-0241-4C09-B2B5-4716C8A4BDF7}" srcOrd="0" destOrd="0" presId="urn:microsoft.com/office/officeart/2005/8/layout/vList3"/>
-    <dgm:cxn modelId="{77135497-3225-4CBC-A8D1-2BEDC7ABB061}" type="presParOf" srcId="{CCA28844-FBDD-4653-9E29-B8E13F5AFBAB}" destId="{E49705B8-EB53-4A66-95D7-148C862C4AAE}" srcOrd="1" destOrd="0" presId="urn:microsoft.com/office/officeart/2005/8/layout/vList3"/>
-    <dgm:cxn modelId="{E759BC3E-9F47-4DDF-B62E-1A2D1E18597E}" type="presParOf" srcId="{23F03EA6-0223-4822-83BF-1B7B21BEC8A0}" destId="{2152ECF2-DA0C-427A-A4C4-D6768C661148}" srcOrd="5" destOrd="0" presId="urn:microsoft.com/office/officeart/2005/8/layout/vList3"/>
-    <dgm:cxn modelId="{3A21F653-34D2-440D-ADBD-C40E87CFB9E9}" type="presParOf" srcId="{23F03EA6-0223-4822-83BF-1B7B21BEC8A0}" destId="{D1C10A06-0B17-4EDE-A916-0CC3E17FAFB1}" srcOrd="6" destOrd="0" presId="urn:microsoft.com/office/officeart/2005/8/layout/vList3"/>
-    <dgm:cxn modelId="{DFA3F8BC-B0D6-4ED8-B5B7-B9F7161562D8}" type="presParOf" srcId="{D1C10A06-0B17-4EDE-A916-0CC3E17FAFB1}" destId="{B1561EA5-98E9-420E-AE26-23966A9AB9C2}" srcOrd="0" destOrd="0" presId="urn:microsoft.com/office/officeart/2005/8/layout/vList3"/>
-    <dgm:cxn modelId="{607F97A1-8D24-4F68-83E1-85D7F1671763}" type="presParOf" srcId="{D1C10A06-0B17-4EDE-A916-0CC3E17FAFB1}" destId="{800E258C-A1D8-4B63-B183-83BF76F88040}" srcOrd="1" destOrd="0" presId="urn:microsoft.com/office/officeart/2005/8/layout/vList3"/>
-    <dgm:cxn modelId="{9C3D3A37-2986-458D-B5C8-D196BCB78C7F}" type="presParOf" srcId="{23F03EA6-0223-4822-83BF-1B7B21BEC8A0}" destId="{E7D55E0A-FA39-46E7-828A-85BADEAD5A6B}" srcOrd="7" destOrd="0" presId="urn:microsoft.com/office/officeart/2005/8/layout/vList3"/>
-    <dgm:cxn modelId="{AB850B74-31E6-483A-B06E-14E7B9CE9905}" type="presParOf" srcId="{23F03EA6-0223-4822-83BF-1B7B21BEC8A0}" destId="{9B39FE8C-1945-49A3-8C1B-C925224B64CB}" srcOrd="8" destOrd="0" presId="urn:microsoft.com/office/officeart/2005/8/layout/vList3"/>
-    <dgm:cxn modelId="{8F6E1C85-6638-44AF-9F41-3656EDEA8DE7}" type="presParOf" srcId="{9B39FE8C-1945-49A3-8C1B-C925224B64CB}" destId="{F354D0C9-6866-48AA-9EF6-E41CE9A8E223}" srcOrd="0" destOrd="0" presId="urn:microsoft.com/office/officeart/2005/8/layout/vList3"/>
-    <dgm:cxn modelId="{77C1D288-7597-4529-B201-07628CFC72FC}" type="presParOf" srcId="{9B39FE8C-1945-49A3-8C1B-C925224B64CB}" destId="{17EDDBAA-6699-4477-B1EB-11327F10C386}" srcOrd="1" destOrd="0" presId="urn:microsoft.com/office/officeart/2005/8/layout/vList3"/>
+    <dgm:cxn modelId="{75A127FE-C797-4C25-BCF5-957F508BC0EC}" type="presOf" srcId="{EA19D553-2732-41B0-8E94-E006A6387682}" destId="{656494F1-6F7F-46F6-B7CC-E7159AED2B17}" srcOrd="0" destOrd="0" presId="urn:microsoft.com/office/officeart/2005/8/layout/pList2"/>
+    <dgm:cxn modelId="{7C1E3F72-5952-4EAC-9939-9D48D3BF4CFE}" type="presParOf" srcId="{F1FE04B6-9F00-469F-B219-75D2FE1B1A38}" destId="{21EA317E-D01E-4268-B4A4-92DD34A6C7C8}" srcOrd="0" destOrd="0" presId="urn:microsoft.com/office/officeart/2005/8/layout/pList2"/>
+    <dgm:cxn modelId="{2182749C-E57C-4EC5-8903-F22AF10A77BC}" type="presParOf" srcId="{F1FE04B6-9F00-469F-B219-75D2FE1B1A38}" destId="{6195C872-2EC9-46B4-AC45-7B58F1234CB5}" srcOrd="1" destOrd="0" presId="urn:microsoft.com/office/officeart/2005/8/layout/pList2"/>
+    <dgm:cxn modelId="{449C62E9-180E-46A1-861B-60ECAB32795F}" type="presParOf" srcId="{6195C872-2EC9-46B4-AC45-7B58F1234CB5}" destId="{4AEEA9EE-B10E-47E1-BACC-8FFACF14E782}" srcOrd="0" destOrd="0" presId="urn:microsoft.com/office/officeart/2005/8/layout/pList2"/>
+    <dgm:cxn modelId="{D466B3C3-B3DB-45B2-9641-89FD50ACE1DE}" type="presParOf" srcId="{4AEEA9EE-B10E-47E1-BACC-8FFACF14E782}" destId="{1054A012-B303-44A5-A91A-98696DAC3CFA}" srcOrd="0" destOrd="0" presId="urn:microsoft.com/office/officeart/2005/8/layout/pList2"/>
+    <dgm:cxn modelId="{70593BB8-2E69-49BA-88FF-9603629D3025}" type="presParOf" srcId="{4AEEA9EE-B10E-47E1-BACC-8FFACF14E782}" destId="{96CAE58E-FC56-4EA3-AF55-9AF85EC35B1E}" srcOrd="1" destOrd="0" presId="urn:microsoft.com/office/officeart/2005/8/layout/pList2"/>
+    <dgm:cxn modelId="{A3ECC964-4DE6-4A6A-8D5D-77508C72E1A8}" type="presParOf" srcId="{4AEEA9EE-B10E-47E1-BACC-8FFACF14E782}" destId="{770826BC-21A1-476E-BB00-FB5AB49A83A8}" srcOrd="2" destOrd="0" presId="urn:microsoft.com/office/officeart/2005/8/layout/pList2"/>
+    <dgm:cxn modelId="{A9A789E1-55D9-47C0-AC3B-9E1E5D7B11D6}" type="presParOf" srcId="{6195C872-2EC9-46B4-AC45-7B58F1234CB5}" destId="{B05E8B3D-1EDF-4CD3-9A03-6A2EE2AB70BC}" srcOrd="1" destOrd="0" presId="urn:microsoft.com/office/officeart/2005/8/layout/pList2"/>
+    <dgm:cxn modelId="{1C9F6CEC-77F6-41FA-8327-4A224AA20D46}" type="presParOf" srcId="{6195C872-2EC9-46B4-AC45-7B58F1234CB5}" destId="{5B9B635E-5550-4947-AA31-5F3E4A4CEA7B}" srcOrd="2" destOrd="0" presId="urn:microsoft.com/office/officeart/2005/8/layout/pList2"/>
+    <dgm:cxn modelId="{040C5D64-14B1-46B4-AAEB-B35652091A0D}" type="presParOf" srcId="{5B9B635E-5550-4947-AA31-5F3E4A4CEA7B}" destId="{565CF413-4EA1-4058-BE15-31A204272AF1}" srcOrd="0" destOrd="0" presId="urn:microsoft.com/office/officeart/2005/8/layout/pList2"/>
+    <dgm:cxn modelId="{1D97B59F-D1ED-45F2-8A5A-C415D005B1C6}" type="presParOf" srcId="{5B9B635E-5550-4947-AA31-5F3E4A4CEA7B}" destId="{843F8169-F7CE-4579-BE9B-F15233D753B1}" srcOrd="1" destOrd="0" presId="urn:microsoft.com/office/officeart/2005/8/layout/pList2"/>
+    <dgm:cxn modelId="{68DF583A-1E15-40CF-8ECE-C5EF3EA38704}" type="presParOf" srcId="{5B9B635E-5550-4947-AA31-5F3E4A4CEA7B}" destId="{049DD801-0F61-4C16-BA38-FD0A1B329717}" srcOrd="2" destOrd="0" presId="urn:microsoft.com/office/officeart/2005/8/layout/pList2"/>
+    <dgm:cxn modelId="{AFBB264D-12F9-4418-B7A5-129695D0E446}" type="presParOf" srcId="{6195C872-2EC9-46B4-AC45-7B58F1234CB5}" destId="{656494F1-6F7F-46F6-B7CC-E7159AED2B17}" srcOrd="3" destOrd="0" presId="urn:microsoft.com/office/officeart/2005/8/layout/pList2"/>
+    <dgm:cxn modelId="{4F6C8BA1-31FB-4C15-A5D5-8866EBA3C299}" type="presParOf" srcId="{6195C872-2EC9-46B4-AC45-7B58F1234CB5}" destId="{493225D2-D647-412C-959B-6912CC6D3729}" srcOrd="4" destOrd="0" presId="urn:microsoft.com/office/officeart/2005/8/layout/pList2"/>
+    <dgm:cxn modelId="{CA0C74D2-F1D9-4AD7-BE49-0C8C30CF2AAD}" type="presParOf" srcId="{493225D2-D647-412C-959B-6912CC6D3729}" destId="{305E261B-2391-46CE-B7B3-E5FE4A1FA948}" srcOrd="0" destOrd="0" presId="urn:microsoft.com/office/officeart/2005/8/layout/pList2"/>
+    <dgm:cxn modelId="{3C0B23A8-F7D7-41D2-AD23-971FA9C7FCA2}" type="presParOf" srcId="{493225D2-D647-412C-959B-6912CC6D3729}" destId="{C79D7441-2EBF-40D1-A7E4-7C9FA9D5BF7F}" srcOrd="1" destOrd="0" presId="urn:microsoft.com/office/officeart/2005/8/layout/pList2"/>
+    <dgm:cxn modelId="{19AC313F-1658-4CDC-A34A-FF9CE06E35C3}" type="presParOf" srcId="{493225D2-D647-412C-959B-6912CC6D3729}" destId="{DEAE018B-5D85-4E56-B256-6E44022F6931}" srcOrd="2" destOrd="0" presId="urn:microsoft.com/office/officeart/2005/8/layout/pList2"/>
+    <dgm:cxn modelId="{970E16A1-C212-44B0-8C22-885C4BA623C3}" type="presParOf" srcId="{6195C872-2EC9-46B4-AC45-7B58F1234CB5}" destId="{C24C0567-A48B-4416-A195-46F0F938DF03}" srcOrd="5" destOrd="0" presId="urn:microsoft.com/office/officeart/2005/8/layout/pList2"/>
+    <dgm:cxn modelId="{F567C31D-6A75-447F-A1C7-8A88EB3BDCA5}" type="presParOf" srcId="{6195C872-2EC9-46B4-AC45-7B58F1234CB5}" destId="{32564428-1D92-4113-81EB-FEA91894CFDF}" srcOrd="6" destOrd="0" presId="urn:microsoft.com/office/officeart/2005/8/layout/pList2"/>
+    <dgm:cxn modelId="{E16C717F-5AA9-4A2F-B64F-82A1E19370EE}" type="presParOf" srcId="{32564428-1D92-4113-81EB-FEA91894CFDF}" destId="{D5379EFD-0EE0-4C90-AD20-FD25A764BDEB}" srcOrd="0" destOrd="0" presId="urn:microsoft.com/office/officeart/2005/8/layout/pList2"/>
+    <dgm:cxn modelId="{146EE4B6-1B63-4F94-BAA0-9FFD5263A434}" type="presParOf" srcId="{32564428-1D92-4113-81EB-FEA91894CFDF}" destId="{C716B2DF-A60A-41FD-B3A8-6C19EC7D00D4}" srcOrd="1" destOrd="0" presId="urn:microsoft.com/office/officeart/2005/8/layout/pList2"/>
+    <dgm:cxn modelId="{35738BE7-8E91-4AFE-A4AD-86E2580DC5C6}" type="presParOf" srcId="{32564428-1D92-4113-81EB-FEA91894CFDF}" destId="{91DD16FE-2974-499F-8186-7B0D3F4A2548}" srcOrd="2" destOrd="0" presId="urn:microsoft.com/office/officeart/2005/8/layout/pList2"/>
+    <dgm:cxn modelId="{941E9DB6-98C9-49E2-A9F5-F73C6AC908D6}" type="presParOf" srcId="{6195C872-2EC9-46B4-AC45-7B58F1234CB5}" destId="{FD8A13AC-E1B1-4BE0-AEA5-87651258B8B2}" srcOrd="7" destOrd="0" presId="urn:microsoft.com/office/officeart/2005/8/layout/pList2"/>
+    <dgm:cxn modelId="{23A1CF77-B0C3-4F2C-A336-FB20BFFF2406}" type="presParOf" srcId="{6195C872-2EC9-46B4-AC45-7B58F1234CB5}" destId="{29447E9B-1105-41AB-941B-139832A66801}" srcOrd="8" destOrd="0" presId="urn:microsoft.com/office/officeart/2005/8/layout/pList2"/>
+    <dgm:cxn modelId="{A3E44C8F-ED95-401A-99FE-6F103DC331F3}" type="presParOf" srcId="{29447E9B-1105-41AB-941B-139832A66801}" destId="{4434AB10-3B68-4F9B-B896-16A6FA197A3E}" srcOrd="0" destOrd="0" presId="urn:microsoft.com/office/officeart/2005/8/layout/pList2"/>
+    <dgm:cxn modelId="{26B8B826-6CD2-4526-9B4D-32E2E8388738}" type="presParOf" srcId="{29447E9B-1105-41AB-941B-139832A66801}" destId="{A6190390-FB52-4E9D-8080-65CD6BCD3176}" srcOrd="1" destOrd="0" presId="urn:microsoft.com/office/officeart/2005/8/layout/pList2"/>
+    <dgm:cxn modelId="{05CCA861-1AA8-48F0-BBDD-83D672A40F8D}" type="presParOf" srcId="{29447E9B-1105-41AB-941B-139832A66801}" destId="{C734EF36-49E4-4C41-B890-1C8E75570946}" srcOrd="2" destOrd="0" presId="urn:microsoft.com/office/officeart/2005/8/layout/pList2"/>
   </dgm:cxnLst>
   <dgm:bg/>
   <dgm:whole/>
@@ -8514,7 +8805,30 @@
     </dgm:pt>
     <dgm:pt modelId="{93EF77D3-8773-45CC-9CDD-1E1E1EC7D46B}" type="pres">
       <dgm:prSet presAssocID="{79BD1AF1-AD2C-44C7-A45D-0DA217EBD0EB}" presName="imgShp" presStyleLbl="fgImgPlace1" presStyleIdx="0" presStyleCnt="2"/>
-      <dgm:spPr/>
+      <dgm:spPr>
+        <a:blipFill dpi="0" rotWithShape="1">
+          <a:blip xmlns:r="http://schemas.openxmlformats.org/officeDocument/2006/relationships" r:embed="rId1">
+            <a:alphaModFix/>
+            <a:extLst>
+              <a:ext uri="{28A0092B-C50C-407E-A947-70E740481C1C}">
+                <a14:useLocalDpi xmlns:a14="http://schemas.microsoft.com/office/drawing/2010/main" val="0"/>
+              </a:ext>
+            </a:extLst>
+          </a:blip>
+          <a:srcRect/>
+          <a:stretch>
+            <a:fillRect t="-17000" b="-17000"/>
+          </a:stretch>
+        </a:blipFill>
+        <a:effectLst>
+          <a:softEdge rad="0"/>
+        </a:effectLst>
+        <a:scene3d>
+          <a:camera prst="orthographicFront"/>
+          <a:lightRig rig="threePt" dir="t"/>
+        </a:scene3d>
+        <a:sp3d/>
+      </dgm:spPr>
     </dgm:pt>
     <dgm:pt modelId="{0CEC0145-29D6-4160-B327-76E386A44003}" type="pres">
       <dgm:prSet presAssocID="{79BD1AF1-AD2C-44C7-A45D-0DA217EBD0EB}" presName="txShp" presStyleLbl="node1" presStyleIdx="0" presStyleCnt="2">
@@ -8534,7 +8848,15 @@
     </dgm:pt>
     <dgm:pt modelId="{C6884B6A-BD2C-4D68-BC35-C11162E906BA}" type="pres">
       <dgm:prSet presAssocID="{0EA823C4-F621-44F8-8105-ECF61E9D5249}" presName="imgShp" presStyleLbl="fgImgPlace1" presStyleIdx="1" presStyleCnt="2"/>
-      <dgm:spPr/>
+      <dgm:spPr>
+        <a:blipFill>
+          <a:blip xmlns:r="http://schemas.openxmlformats.org/officeDocument/2006/relationships" r:embed="rId2"/>
+          <a:srcRect/>
+          <a:stretch>
+            <a:fillRect t="-10000" b="-10000"/>
+          </a:stretch>
+        </a:blipFill>
+      </dgm:spPr>
     </dgm:pt>
     <dgm:pt modelId="{95BF006B-3C65-4115-BA55-6F45EB96342E}" type="pres">
       <dgm:prSet presAssocID="{0EA823C4-F621-44F8-8105-ECF61E9D5249}" presName="txShp" presStyleLbl="node1" presStyleIdx="1" presStyleCnt="2">
@@ -12326,21 +12648,25 @@
       <dsp:cNvGrpSpPr/>
     </dsp:nvGrpSpPr>
     <dsp:grpSpPr/>
-    <dsp:sp modelId="{0CEC0145-29D6-4160-B327-76E386A44003}">
+    <dsp:sp modelId="{21EA317E-D01E-4268-B4A4-92DD34A6C7C8}">
       <dsp:nvSpPr>
         <dsp:cNvPr id="0" name=""/>
         <dsp:cNvSpPr/>
       </dsp:nvSpPr>
       <dsp:spPr>
-        <a:xfrm rot="10800000">
-          <a:off x="1965108" y="919"/>
-          <a:ext cx="7158616" cy="647992"/>
+        <a:xfrm>
+          <a:off x="0" y="0"/>
+          <a:ext cx="10764837" cy="1778360"/>
         </a:xfrm>
-        <a:prstGeom prst="homePlate">
-          <a:avLst/>
+        <a:prstGeom prst="roundRect">
+          <a:avLst>
+            <a:gd name="adj" fmla="val 10000"/>
+          </a:avLst>
         </a:prstGeom>
         <a:solidFill>
-          <a:schemeClr val="accent1">
+          <a:schemeClr val="lt1">
+            <a:alpha val="90000"/>
+            <a:tint val="40000"/>
             <a:hueOff val="0"/>
             <a:satOff val="0"/>
             <a:lumOff val="0"/>
@@ -12349,7 +12675,114 @@
         </a:solidFill>
         <a:ln w="19050" cap="rnd" cmpd="sng" algn="ctr">
           <a:solidFill>
-            <a:schemeClr val="lt1">
+            <a:schemeClr val="dk1">
+              <a:alpha val="90000"/>
+              <a:hueOff val="0"/>
+              <a:satOff val="0"/>
+              <a:lumOff val="0"/>
+              <a:alphaOff val="0"/>
+            </a:schemeClr>
+          </a:solidFill>
+          <a:prstDash val="solid"/>
+        </a:ln>
+        <a:effectLst/>
+      </dsp:spPr>
+      <dsp:style>
+        <a:lnRef idx="2">
+          <a:scrgbClr r="0" g="0" b="0"/>
+        </a:lnRef>
+        <a:fillRef idx="1">
+          <a:scrgbClr r="0" g="0" b="0"/>
+        </a:fillRef>
+        <a:effectRef idx="0">
+          <a:scrgbClr r="0" g="0" b="0"/>
+        </a:effectRef>
+        <a:fontRef idx="minor"/>
+      </dsp:style>
+    </dsp:sp>
+    <dsp:sp modelId="{770826BC-21A1-476E-BB00-FB5AB49A83A8}">
+      <dsp:nvSpPr>
+        <dsp:cNvPr id="0" name=""/>
+        <dsp:cNvSpPr/>
+      </dsp:nvSpPr>
+      <dsp:spPr>
+        <a:xfrm>
+          <a:off x="326403" y="237114"/>
+          <a:ext cx="1872598" cy="1304131"/>
+        </a:xfrm>
+        <a:prstGeom prst="roundRect">
+          <a:avLst>
+            <a:gd name="adj" fmla="val 10000"/>
+          </a:avLst>
+        </a:prstGeom>
+        <a:blipFill>
+          <a:blip xmlns:r="http://schemas.openxmlformats.org/officeDocument/2006/relationships" r:embed="rId1">
+            <a:extLst>
+              <a:ext uri="{96DAC541-7B7A-43D3-8B79-37D633B846F1}">
+                <asvg:svgBlip xmlns:asvg="http://schemas.microsoft.com/office/drawing/2016/SVG/main" r:embed="rId2"/>
+              </a:ext>
+            </a:extLst>
+          </a:blip>
+          <a:srcRect/>
+          <a:stretch>
+            <a:fillRect l="-25000" r="-25000"/>
+          </a:stretch>
+        </a:blipFill>
+        <a:ln w="19050" cap="rnd" cmpd="sng" algn="ctr">
+          <a:solidFill>
+            <a:schemeClr val="dk1">
+              <a:shade val="80000"/>
+              <a:hueOff val="0"/>
+              <a:satOff val="0"/>
+              <a:lumOff val="0"/>
+              <a:alphaOff val="0"/>
+            </a:schemeClr>
+          </a:solidFill>
+          <a:prstDash val="solid"/>
+        </a:ln>
+        <a:effectLst/>
+      </dsp:spPr>
+      <dsp:style>
+        <a:lnRef idx="2">
+          <a:scrgbClr r="0" g="0" b="0"/>
+        </a:lnRef>
+        <a:fillRef idx="1">
+          <a:scrgbClr r="0" g="0" b="0"/>
+        </a:fillRef>
+        <a:effectRef idx="0">
+          <a:scrgbClr r="0" g="0" b="0"/>
+        </a:effectRef>
+        <a:fontRef idx="minor"/>
+      </dsp:style>
+    </dsp:sp>
+    <dsp:sp modelId="{1054A012-B303-44A5-A91A-98696DAC3CFA}">
+      <dsp:nvSpPr>
+        <dsp:cNvPr id="0" name=""/>
+        <dsp:cNvSpPr/>
+      </dsp:nvSpPr>
+      <dsp:spPr>
+        <a:xfrm rot="10800000">
+          <a:off x="326403" y="1778360"/>
+          <a:ext cx="1872598" cy="2173552"/>
+        </a:xfrm>
+        <a:prstGeom prst="round2SameRect">
+          <a:avLst>
+            <a:gd name="adj1" fmla="val 10500"/>
+            <a:gd name="adj2" fmla="val 0"/>
+          </a:avLst>
+        </a:prstGeom>
+        <a:solidFill>
+          <a:schemeClr val="lt1">
+            <a:hueOff val="0"/>
+            <a:satOff val="0"/>
+            <a:lumOff val="0"/>
+            <a:alphaOff val="0"/>
+          </a:schemeClr>
+        </a:solidFill>
+        <a:ln w="19050" cap="rnd" cmpd="sng" algn="ctr">
+          <a:solidFill>
+            <a:schemeClr val="dk1">
+              <a:shade val="80000"/>
               <a:hueOff val="0"/>
               <a:satOff val="0"/>
               <a:lumOff val="0"/>
@@ -12375,12 +12808,12 @@
         </a:fontRef>
       </dsp:style>
       <dsp:txBody>
-        <a:bodyPr spcFirstLastPara="0" vert="horz" wrap="square" lIns="285747" tIns="118110" rIns="220472" bIns="118110" numCol="1" spcCol="1270" anchor="ctr" anchorCtr="0">
+        <a:bodyPr spcFirstLastPara="0" vert="horz" wrap="square" lIns="248920" tIns="248920" rIns="248920" bIns="248920" numCol="1" spcCol="1270" anchor="t" anchorCtr="0">
           <a:noAutofit/>
         </a:bodyPr>
         <a:lstStyle/>
         <a:p>
-          <a:pPr marL="0" lvl="0" indent="0" algn="ctr" defTabSz="1377950">
+          <a:pPr marL="0" lvl="0" indent="0" algn="ctr" defTabSz="1555750">
             <a:lnSpc>
               <a:spcPct val="90000"/>
             </a:lnSpc>
@@ -12393,42 +12826,49 @@
             <a:buNone/>
           </a:pPr>
           <a:r>
-            <a:rPr lang="en-029" sz="3100" kern="1200" dirty="0"/>
+            <a:rPr lang="en-029" sz="3500" kern="1200" dirty="0"/>
             <a:t>Arrow Left</a:t>
           </a:r>
-          <a:endParaRPr lang="en-JM" sz="3100" kern="1200" dirty="0"/>
+          <a:endParaRPr lang="en-JM" sz="3500" kern="1200" dirty="0"/>
         </a:p>
       </dsp:txBody>
       <dsp:txXfrm rot="10800000">
-        <a:off x="2127106" y="919"/>
-        <a:ext cx="6996618" cy="647992"/>
+        <a:off x="383992" y="1778360"/>
+        <a:ext cx="1757420" cy="2115963"/>
       </dsp:txXfrm>
     </dsp:sp>
-    <dsp:sp modelId="{93EF77D3-8773-45CC-9CDD-1E1E1EC7D46B}">
+    <dsp:sp modelId="{049DD801-0F61-4C16-BA38-FD0A1B329717}">
       <dsp:nvSpPr>
         <dsp:cNvPr id="0" name=""/>
         <dsp:cNvSpPr/>
       </dsp:nvSpPr>
       <dsp:spPr>
         <a:xfrm>
-          <a:off x="1641112" y="919"/>
-          <a:ext cx="647992" cy="647992"/>
+          <a:off x="2386261" y="237114"/>
+          <a:ext cx="1872598" cy="1304131"/>
         </a:xfrm>
-        <a:prstGeom prst="ellipse">
-          <a:avLst/>
+        <a:prstGeom prst="roundRect">
+          <a:avLst>
+            <a:gd name="adj" fmla="val 10000"/>
+          </a:avLst>
         </a:prstGeom>
-        <a:solidFill>
-          <a:schemeClr val="accent1">
-            <a:tint val="50000"/>
-            <a:hueOff val="0"/>
-            <a:satOff val="0"/>
-            <a:lumOff val="0"/>
-            <a:alphaOff val="0"/>
-          </a:schemeClr>
-        </a:solidFill>
+        <a:blipFill>
+          <a:blip xmlns:r="http://schemas.openxmlformats.org/officeDocument/2006/relationships" r:embed="rId3">
+            <a:extLst>
+              <a:ext uri="{96DAC541-7B7A-43D3-8B79-37D633B846F1}">
+                <asvg:svgBlip xmlns:asvg="http://schemas.microsoft.com/office/drawing/2016/SVG/main" r:embed="rId4"/>
+              </a:ext>
+            </a:extLst>
+          </a:blip>
+          <a:srcRect/>
+          <a:stretch>
+            <a:fillRect l="-25000" r="-25000"/>
+          </a:stretch>
+        </a:blipFill>
         <a:ln w="19050" cap="rnd" cmpd="sng" algn="ctr">
           <a:solidFill>
-            <a:schemeClr val="lt1">
+            <a:schemeClr val="dk1">
+              <a:shade val="80000"/>
               <a:hueOff val="0"/>
               <a:satOff val="0"/>
               <a:lumOff val="0"/>
@@ -12452,21 +12892,24 @@
         <a:fontRef idx="minor"/>
       </dsp:style>
     </dsp:sp>
-    <dsp:sp modelId="{277D4B6D-CD34-4BB2-8CCE-921B7BE9DDF7}">
+    <dsp:sp modelId="{565CF413-4EA1-4058-BE15-31A204272AF1}">
       <dsp:nvSpPr>
         <dsp:cNvPr id="0" name=""/>
         <dsp:cNvSpPr/>
       </dsp:nvSpPr>
       <dsp:spPr>
         <a:xfrm rot="10800000">
-          <a:off x="1965108" y="826440"/>
-          <a:ext cx="7158616" cy="647992"/>
+          <a:off x="2386261" y="1778360"/>
+          <a:ext cx="1872598" cy="2173552"/>
         </a:xfrm>
-        <a:prstGeom prst="homePlate">
-          <a:avLst/>
+        <a:prstGeom prst="round2SameRect">
+          <a:avLst>
+            <a:gd name="adj1" fmla="val 10500"/>
+            <a:gd name="adj2" fmla="val 0"/>
+          </a:avLst>
         </a:prstGeom>
         <a:solidFill>
-          <a:schemeClr val="accent1">
+          <a:schemeClr val="lt1">
             <a:hueOff val="0"/>
             <a:satOff val="0"/>
             <a:lumOff val="0"/>
@@ -12475,7 +12918,8 @@
         </a:solidFill>
         <a:ln w="19050" cap="rnd" cmpd="sng" algn="ctr">
           <a:solidFill>
-            <a:schemeClr val="lt1">
+            <a:schemeClr val="dk1">
+              <a:shade val="80000"/>
               <a:hueOff val="0"/>
               <a:satOff val="0"/>
               <a:lumOff val="0"/>
@@ -12501,12 +12945,12 @@
         </a:fontRef>
       </dsp:style>
       <dsp:txBody>
-        <a:bodyPr spcFirstLastPara="0" vert="horz" wrap="square" lIns="285747" tIns="118110" rIns="220472" bIns="118110" numCol="1" spcCol="1270" anchor="ctr" anchorCtr="0">
+        <a:bodyPr spcFirstLastPara="0" vert="horz" wrap="square" lIns="248920" tIns="248920" rIns="248920" bIns="248920" numCol="1" spcCol="1270" anchor="t" anchorCtr="0">
           <a:noAutofit/>
         </a:bodyPr>
         <a:lstStyle/>
         <a:p>
-          <a:pPr marL="0" lvl="0" indent="0" algn="ctr" defTabSz="1377950">
+          <a:pPr marL="0" lvl="0" indent="0" algn="ctr" defTabSz="1555750">
             <a:lnSpc>
               <a:spcPct val="90000"/>
             </a:lnSpc>
@@ -12519,42 +12963,49 @@
             <a:buNone/>
           </a:pPr>
           <a:r>
-            <a:rPr lang="en-029" sz="3100" kern="1200" dirty="0"/>
+            <a:rPr lang="en-029" sz="3500" kern="1200" dirty="0"/>
             <a:t>Arrow Right</a:t>
           </a:r>
-          <a:endParaRPr lang="en-JM" sz="3100" kern="1200" dirty="0"/>
+          <a:endParaRPr lang="en-JM" sz="3500" kern="1200" dirty="0"/>
         </a:p>
       </dsp:txBody>
       <dsp:txXfrm rot="10800000">
-        <a:off x="2127106" y="826440"/>
-        <a:ext cx="6996618" cy="647992"/>
+        <a:off x="2443850" y="1778360"/>
+        <a:ext cx="1757420" cy="2115963"/>
       </dsp:txXfrm>
     </dsp:sp>
-    <dsp:sp modelId="{2DDBA050-660C-4511-89D8-87B11F957810}">
+    <dsp:sp modelId="{DEAE018B-5D85-4E56-B256-6E44022F6931}">
       <dsp:nvSpPr>
         <dsp:cNvPr id="0" name=""/>
         <dsp:cNvSpPr/>
       </dsp:nvSpPr>
       <dsp:spPr>
         <a:xfrm>
-          <a:off x="1641112" y="826440"/>
-          <a:ext cx="647992" cy="647992"/>
+          <a:off x="4446119" y="237114"/>
+          <a:ext cx="1872598" cy="1304131"/>
         </a:xfrm>
-        <a:prstGeom prst="ellipse">
-          <a:avLst/>
+        <a:prstGeom prst="roundRect">
+          <a:avLst>
+            <a:gd name="adj" fmla="val 10000"/>
+          </a:avLst>
         </a:prstGeom>
-        <a:solidFill>
-          <a:schemeClr val="accent1">
-            <a:tint val="50000"/>
-            <a:hueOff val="0"/>
-            <a:satOff val="0"/>
-            <a:lumOff val="0"/>
-            <a:alphaOff val="0"/>
-          </a:schemeClr>
-        </a:solidFill>
+        <a:blipFill>
+          <a:blip xmlns:r="http://schemas.openxmlformats.org/officeDocument/2006/relationships" r:embed="rId5">
+            <a:extLst>
+              <a:ext uri="{96DAC541-7B7A-43D3-8B79-37D633B846F1}">
+                <asvg:svgBlip xmlns:asvg="http://schemas.microsoft.com/office/drawing/2016/SVG/main" r:embed="rId6"/>
+              </a:ext>
+            </a:extLst>
+          </a:blip>
+          <a:srcRect/>
+          <a:stretch>
+            <a:fillRect l="-25000" r="-25000"/>
+          </a:stretch>
+        </a:blipFill>
         <a:ln w="19050" cap="rnd" cmpd="sng" algn="ctr">
           <a:solidFill>
-            <a:schemeClr val="lt1">
+            <a:schemeClr val="dk1">
+              <a:shade val="80000"/>
               <a:hueOff val="0"/>
               <a:satOff val="0"/>
               <a:lumOff val="0"/>
@@ -12578,21 +13029,24 @@
         <a:fontRef idx="minor"/>
       </dsp:style>
     </dsp:sp>
-    <dsp:sp modelId="{E49705B8-EB53-4A66-95D7-148C862C4AAE}">
+    <dsp:sp modelId="{305E261B-2391-46CE-B7B3-E5FE4A1FA948}">
       <dsp:nvSpPr>
         <dsp:cNvPr id="0" name=""/>
         <dsp:cNvSpPr/>
       </dsp:nvSpPr>
       <dsp:spPr>
         <a:xfrm rot="10800000">
-          <a:off x="1965108" y="1651960"/>
-          <a:ext cx="7158616" cy="647992"/>
+          <a:off x="4446119" y="1778360"/>
+          <a:ext cx="1872598" cy="2173552"/>
         </a:xfrm>
-        <a:prstGeom prst="homePlate">
-          <a:avLst/>
+        <a:prstGeom prst="round2SameRect">
+          <a:avLst>
+            <a:gd name="adj1" fmla="val 10500"/>
+            <a:gd name="adj2" fmla="val 0"/>
+          </a:avLst>
         </a:prstGeom>
         <a:solidFill>
-          <a:schemeClr val="accent1">
+          <a:schemeClr val="lt1">
             <a:hueOff val="0"/>
             <a:satOff val="0"/>
             <a:lumOff val="0"/>
@@ -12601,7 +13055,8 @@
         </a:solidFill>
         <a:ln w="19050" cap="rnd" cmpd="sng" algn="ctr">
           <a:solidFill>
-            <a:schemeClr val="lt1">
+            <a:schemeClr val="dk1">
+              <a:shade val="80000"/>
               <a:hueOff val="0"/>
               <a:satOff val="0"/>
               <a:lumOff val="0"/>
@@ -12627,12 +13082,12 @@
         </a:fontRef>
       </dsp:style>
       <dsp:txBody>
-        <a:bodyPr spcFirstLastPara="0" vert="horz" wrap="square" lIns="285747" tIns="118110" rIns="220472" bIns="118110" numCol="1" spcCol="1270" anchor="ctr" anchorCtr="0">
+        <a:bodyPr spcFirstLastPara="0" vert="horz" wrap="square" lIns="248920" tIns="248920" rIns="248920" bIns="248920" numCol="1" spcCol="1270" anchor="t" anchorCtr="0">
           <a:noAutofit/>
         </a:bodyPr>
         <a:lstStyle/>
         <a:p>
-          <a:pPr marL="0" lvl="0" indent="0" algn="ctr" defTabSz="1377950">
+          <a:pPr marL="0" lvl="0" indent="0" algn="ctr" defTabSz="1555750">
             <a:lnSpc>
               <a:spcPct val="90000"/>
             </a:lnSpc>
@@ -12645,42 +13100,49 @@
             <a:buNone/>
           </a:pPr>
           <a:r>
-            <a:rPr lang="en-029" sz="3100" kern="1200" dirty="0"/>
+            <a:rPr lang="en-029" sz="3500" kern="1200" dirty="0"/>
             <a:t>Arrow UP</a:t>
           </a:r>
-          <a:endParaRPr lang="en-JM" sz="3100" kern="1200" dirty="0"/>
+          <a:endParaRPr lang="en-JM" sz="3500" kern="1200" dirty="0"/>
         </a:p>
       </dsp:txBody>
       <dsp:txXfrm rot="10800000">
-        <a:off x="2127106" y="1651960"/>
-        <a:ext cx="6996618" cy="647992"/>
+        <a:off x="4503708" y="1778360"/>
+        <a:ext cx="1757420" cy="2115963"/>
       </dsp:txXfrm>
     </dsp:sp>
-    <dsp:sp modelId="{791087E5-0241-4C09-B2B5-4716C8A4BDF7}">
+    <dsp:sp modelId="{91DD16FE-2974-499F-8186-7B0D3F4A2548}">
       <dsp:nvSpPr>
         <dsp:cNvPr id="0" name=""/>
         <dsp:cNvSpPr/>
       </dsp:nvSpPr>
       <dsp:spPr>
         <a:xfrm>
-          <a:off x="1641112" y="1651960"/>
-          <a:ext cx="647992" cy="647992"/>
+          <a:off x="6505977" y="237114"/>
+          <a:ext cx="1872598" cy="1304131"/>
         </a:xfrm>
-        <a:prstGeom prst="ellipse">
-          <a:avLst/>
+        <a:prstGeom prst="roundRect">
+          <a:avLst>
+            <a:gd name="adj" fmla="val 10000"/>
+          </a:avLst>
         </a:prstGeom>
-        <a:solidFill>
-          <a:schemeClr val="accent1">
-            <a:tint val="50000"/>
-            <a:hueOff val="0"/>
-            <a:satOff val="0"/>
-            <a:lumOff val="0"/>
-            <a:alphaOff val="0"/>
-          </a:schemeClr>
-        </a:solidFill>
+        <a:blipFill>
+          <a:blip xmlns:r="http://schemas.openxmlformats.org/officeDocument/2006/relationships" r:embed="rId7">
+            <a:extLst>
+              <a:ext uri="{96DAC541-7B7A-43D3-8B79-37D633B846F1}">
+                <asvg:svgBlip xmlns:asvg="http://schemas.microsoft.com/office/drawing/2016/SVG/main" r:embed="rId8"/>
+              </a:ext>
+            </a:extLst>
+          </a:blip>
+          <a:srcRect/>
+          <a:stretch>
+            <a:fillRect l="-25000" r="-25000"/>
+          </a:stretch>
+        </a:blipFill>
         <a:ln w="19050" cap="rnd" cmpd="sng" algn="ctr">
           <a:solidFill>
-            <a:schemeClr val="lt1">
+            <a:schemeClr val="dk1">
+              <a:shade val="80000"/>
               <a:hueOff val="0"/>
               <a:satOff val="0"/>
               <a:lumOff val="0"/>
@@ -12704,21 +13166,24 @@
         <a:fontRef idx="minor"/>
       </dsp:style>
     </dsp:sp>
-    <dsp:sp modelId="{800E258C-A1D8-4B63-B183-83BF76F88040}">
+    <dsp:sp modelId="{D5379EFD-0EE0-4C90-AD20-FD25A764BDEB}">
       <dsp:nvSpPr>
         <dsp:cNvPr id="0" name=""/>
         <dsp:cNvSpPr/>
       </dsp:nvSpPr>
       <dsp:spPr>
         <a:xfrm rot="10800000">
-          <a:off x="1965108" y="2477480"/>
-          <a:ext cx="7158616" cy="647992"/>
+          <a:off x="6505977" y="1778360"/>
+          <a:ext cx="1872598" cy="2173552"/>
         </a:xfrm>
-        <a:prstGeom prst="homePlate">
-          <a:avLst/>
+        <a:prstGeom prst="round2SameRect">
+          <a:avLst>
+            <a:gd name="adj1" fmla="val 10500"/>
+            <a:gd name="adj2" fmla="val 0"/>
+          </a:avLst>
         </a:prstGeom>
         <a:solidFill>
-          <a:schemeClr val="accent1">
+          <a:schemeClr val="lt1">
             <a:hueOff val="0"/>
             <a:satOff val="0"/>
             <a:lumOff val="0"/>
@@ -12727,7 +13192,8 @@
         </a:solidFill>
         <a:ln w="19050" cap="rnd" cmpd="sng" algn="ctr">
           <a:solidFill>
-            <a:schemeClr val="lt1">
+            <a:schemeClr val="dk1">
+              <a:shade val="80000"/>
               <a:hueOff val="0"/>
               <a:satOff val="0"/>
               <a:lumOff val="0"/>
@@ -12753,12 +13219,12 @@
         </a:fontRef>
       </dsp:style>
       <dsp:txBody>
-        <a:bodyPr spcFirstLastPara="0" vert="horz" wrap="square" lIns="285747" tIns="118110" rIns="220472" bIns="118110" numCol="1" spcCol="1270" anchor="ctr" anchorCtr="0">
+        <a:bodyPr spcFirstLastPara="0" vert="horz" wrap="square" lIns="248920" tIns="248920" rIns="248920" bIns="248920" numCol="1" spcCol="1270" anchor="t" anchorCtr="0">
           <a:noAutofit/>
         </a:bodyPr>
         <a:lstStyle/>
         <a:p>
-          <a:pPr marL="0" lvl="0" indent="0" algn="ctr" defTabSz="1377950">
+          <a:pPr marL="0" lvl="0" indent="0" algn="ctr" defTabSz="1555750">
             <a:lnSpc>
               <a:spcPct val="90000"/>
             </a:lnSpc>
@@ -12771,42 +13237,49 @@
             <a:buNone/>
           </a:pPr>
           <a:r>
-            <a:rPr lang="en-029" sz="3100" kern="1200" dirty="0"/>
+            <a:rPr lang="en-029" sz="3500" kern="1200" dirty="0"/>
             <a:t>Arrow Down</a:t>
           </a:r>
-          <a:endParaRPr lang="en-JM" sz="3100" kern="1200" dirty="0"/>
+          <a:endParaRPr lang="en-JM" sz="3500" kern="1200" dirty="0"/>
         </a:p>
       </dsp:txBody>
       <dsp:txXfrm rot="10800000">
-        <a:off x="2127106" y="2477480"/>
-        <a:ext cx="6996618" cy="647992"/>
+        <a:off x="6563566" y="1778360"/>
+        <a:ext cx="1757420" cy="2115963"/>
       </dsp:txXfrm>
     </dsp:sp>
-    <dsp:sp modelId="{B1561EA5-98E9-420E-AE26-23966A9AB9C2}">
+    <dsp:sp modelId="{C734EF36-49E4-4C41-B890-1C8E75570946}">
       <dsp:nvSpPr>
         <dsp:cNvPr id="0" name=""/>
         <dsp:cNvSpPr/>
       </dsp:nvSpPr>
       <dsp:spPr>
         <a:xfrm>
-          <a:off x="1641112" y="2477480"/>
-          <a:ext cx="647992" cy="647992"/>
+          <a:off x="8565835" y="237114"/>
+          <a:ext cx="1872598" cy="1304131"/>
         </a:xfrm>
-        <a:prstGeom prst="ellipse">
-          <a:avLst/>
+        <a:prstGeom prst="roundRect">
+          <a:avLst>
+            <a:gd name="adj" fmla="val 10000"/>
+          </a:avLst>
         </a:prstGeom>
-        <a:solidFill>
-          <a:schemeClr val="accent1">
-            <a:tint val="50000"/>
-            <a:hueOff val="0"/>
-            <a:satOff val="0"/>
-            <a:lumOff val="0"/>
-            <a:alphaOff val="0"/>
-          </a:schemeClr>
-        </a:solidFill>
+        <a:blipFill>
+          <a:blip xmlns:r="http://schemas.openxmlformats.org/officeDocument/2006/relationships" r:embed="rId9">
+            <a:extLst>
+              <a:ext uri="{96DAC541-7B7A-43D3-8B79-37D633B846F1}">
+                <asvg:svgBlip xmlns:asvg="http://schemas.microsoft.com/office/drawing/2016/SVG/main" r:embed="rId10"/>
+              </a:ext>
+            </a:extLst>
+          </a:blip>
+          <a:srcRect/>
+          <a:stretch>
+            <a:fillRect t="-22000" b="-22000"/>
+          </a:stretch>
+        </a:blipFill>
         <a:ln w="19050" cap="rnd" cmpd="sng" algn="ctr">
           <a:solidFill>
-            <a:schemeClr val="lt1">
+            <a:schemeClr val="dk1">
+              <a:shade val="80000"/>
               <a:hueOff val="0"/>
               <a:satOff val="0"/>
               <a:lumOff val="0"/>
@@ -12830,21 +13303,24 @@
         <a:fontRef idx="minor"/>
       </dsp:style>
     </dsp:sp>
-    <dsp:sp modelId="{17EDDBAA-6699-4477-B1EB-11327F10C386}">
+    <dsp:sp modelId="{4434AB10-3B68-4F9B-B896-16A6FA197A3E}">
       <dsp:nvSpPr>
         <dsp:cNvPr id="0" name=""/>
         <dsp:cNvSpPr/>
       </dsp:nvSpPr>
       <dsp:spPr>
         <a:xfrm rot="10800000">
-          <a:off x="1965108" y="3303000"/>
-          <a:ext cx="7158616" cy="647992"/>
+          <a:off x="8565835" y="1778360"/>
+          <a:ext cx="1872598" cy="2173552"/>
         </a:xfrm>
-        <a:prstGeom prst="homePlate">
-          <a:avLst/>
+        <a:prstGeom prst="round2SameRect">
+          <a:avLst>
+            <a:gd name="adj1" fmla="val 10500"/>
+            <a:gd name="adj2" fmla="val 0"/>
+          </a:avLst>
         </a:prstGeom>
         <a:solidFill>
-          <a:schemeClr val="accent1">
+          <a:schemeClr val="lt1">
             <a:hueOff val="0"/>
             <a:satOff val="0"/>
             <a:lumOff val="0"/>
@@ -12853,7 +13329,8 @@
         </a:solidFill>
         <a:ln w="19050" cap="rnd" cmpd="sng" algn="ctr">
           <a:solidFill>
-            <a:schemeClr val="lt1">
+            <a:schemeClr val="dk1">
+              <a:shade val="80000"/>
               <a:hueOff val="0"/>
               <a:satOff val="0"/>
               <a:lumOff val="0"/>
@@ -12879,12 +13356,12 @@
         </a:fontRef>
       </dsp:style>
       <dsp:txBody>
-        <a:bodyPr spcFirstLastPara="0" vert="horz" wrap="square" lIns="285747" tIns="118110" rIns="220472" bIns="118110" numCol="1" spcCol="1270" anchor="ctr" anchorCtr="0">
+        <a:bodyPr spcFirstLastPara="0" vert="horz" wrap="square" lIns="248920" tIns="248920" rIns="248920" bIns="248920" numCol="1" spcCol="1270" anchor="t" anchorCtr="0">
           <a:noAutofit/>
         </a:bodyPr>
         <a:lstStyle/>
         <a:p>
-          <a:pPr marL="0" lvl="0" indent="0" algn="ctr" defTabSz="1377950">
+          <a:pPr marL="0" lvl="0" indent="0" algn="ctr" defTabSz="1555750">
             <a:lnSpc>
               <a:spcPct val="90000"/>
             </a:lnSpc>
@@ -12897,64 +13374,16 @@
             <a:buNone/>
           </a:pPr>
           <a:r>
-            <a:rPr lang="en-029" sz="3100" kern="1200" dirty="0"/>
+            <a:rPr lang="en-029" sz="3500" kern="1200" dirty="0"/>
             <a:t>Select Icon</a:t>
           </a:r>
-          <a:endParaRPr lang="en-JM" sz="3100" kern="1200"/>
+          <a:endParaRPr lang="en-JM" sz="3500" kern="1200"/>
         </a:p>
       </dsp:txBody>
       <dsp:txXfrm rot="10800000">
-        <a:off x="2127106" y="3303000"/>
-        <a:ext cx="6996618" cy="647992"/>
+        <a:off x="8623424" y="1778360"/>
+        <a:ext cx="1757420" cy="2115963"/>
       </dsp:txXfrm>
-    </dsp:sp>
-    <dsp:sp modelId="{F354D0C9-6866-48AA-9EF6-E41CE9A8E223}">
-      <dsp:nvSpPr>
-        <dsp:cNvPr id="0" name=""/>
-        <dsp:cNvSpPr/>
-      </dsp:nvSpPr>
-      <dsp:spPr>
-        <a:xfrm>
-          <a:off x="1641112" y="3303000"/>
-          <a:ext cx="647992" cy="647992"/>
-        </a:xfrm>
-        <a:prstGeom prst="ellipse">
-          <a:avLst/>
-        </a:prstGeom>
-        <a:solidFill>
-          <a:schemeClr val="accent1">
-            <a:tint val="50000"/>
-            <a:hueOff val="0"/>
-            <a:satOff val="0"/>
-            <a:lumOff val="0"/>
-            <a:alphaOff val="0"/>
-          </a:schemeClr>
-        </a:solidFill>
-        <a:ln w="19050" cap="rnd" cmpd="sng" algn="ctr">
-          <a:solidFill>
-            <a:schemeClr val="lt1">
-              <a:hueOff val="0"/>
-              <a:satOff val="0"/>
-              <a:lumOff val="0"/>
-              <a:alphaOff val="0"/>
-            </a:schemeClr>
-          </a:solidFill>
-          <a:prstDash val="solid"/>
-        </a:ln>
-        <a:effectLst/>
-      </dsp:spPr>
-      <dsp:style>
-        <a:lnRef idx="2">
-          <a:scrgbClr r="0" g="0" b="0"/>
-        </a:lnRef>
-        <a:fillRef idx="1">
-          <a:scrgbClr r="0" g="0" b="0"/>
-        </a:fillRef>
-        <a:effectRef idx="0">
-          <a:scrgbClr r="0" g="0" b="0"/>
-        </a:effectRef>
-        <a:fontRef idx="minor"/>
-      </dsp:style>
     </dsp:sp>
   </dsp:spTree>
 </dsp:drawing>
@@ -13059,15 +13488,20 @@
         <a:prstGeom prst="ellipse">
           <a:avLst/>
         </a:prstGeom>
-        <a:solidFill>
-          <a:schemeClr val="accent1">
-            <a:tint val="50000"/>
-            <a:hueOff val="0"/>
-            <a:satOff val="0"/>
-            <a:lumOff val="0"/>
-            <a:alphaOff val="0"/>
-          </a:schemeClr>
-        </a:solidFill>
+        <a:blipFill dpi="0" rotWithShape="1">
+          <a:blip xmlns:r="http://schemas.openxmlformats.org/officeDocument/2006/relationships" r:embed="rId1">
+            <a:alphaModFix/>
+            <a:extLst>
+              <a:ext uri="{28A0092B-C50C-407E-A947-70E740481C1C}">
+                <a14:useLocalDpi xmlns:a14="http://schemas.microsoft.com/office/drawing/2010/main" val="0"/>
+              </a:ext>
+            </a:extLst>
+          </a:blip>
+          <a:srcRect/>
+          <a:stretch>
+            <a:fillRect t="-17000" b="-17000"/>
+          </a:stretch>
+        </a:blipFill>
         <a:ln w="19050" cap="rnd" cmpd="sng" algn="ctr">
           <a:solidFill>
             <a:schemeClr val="lt1">
@@ -13079,7 +13513,14 @@
           </a:solidFill>
           <a:prstDash val="solid"/>
         </a:ln>
-        <a:effectLst/>
+        <a:effectLst>
+          <a:softEdge rad="0"/>
+        </a:effectLst>
+        <a:scene3d>
+          <a:camera prst="orthographicFront"/>
+          <a:lightRig rig="threePt" dir="t"/>
+        </a:scene3d>
+        <a:sp3d/>
       </dsp:spPr>
       <dsp:style>
         <a:lnRef idx="2">
@@ -13185,15 +13626,13 @@
         <a:prstGeom prst="ellipse">
           <a:avLst/>
         </a:prstGeom>
-        <a:solidFill>
-          <a:schemeClr val="accent1">
-            <a:tint val="50000"/>
-            <a:hueOff val="0"/>
-            <a:satOff val="0"/>
-            <a:lumOff val="0"/>
-            <a:alphaOff val="0"/>
-          </a:schemeClr>
-        </a:solidFill>
+        <a:blipFill>
+          <a:blip xmlns:r="http://schemas.openxmlformats.org/officeDocument/2006/relationships" r:embed="rId2"/>
+          <a:srcRect/>
+          <a:stretch>
+            <a:fillRect t="-10000" b="-10000"/>
+          </a:stretch>
+        </a:blipFill>
         <a:ln w="19050" cap="rnd" cmpd="sng" algn="ctr">
           <a:solidFill>
             <a:schemeClr val="lt1">
@@ -15548,14 +15987,13 @@
 </file>
 
 <file path=ppt/diagrams/layout5.xml><?xml version="1.0" encoding="utf-8"?>
-<dgm:layoutDef xmlns:dgm="http://schemas.openxmlformats.org/drawingml/2006/diagram" xmlns:a="http://schemas.openxmlformats.org/drawingml/2006/main" uniqueId="urn:microsoft.com/office/officeart/2005/8/layout/vList3">
+<dgm:layoutDef xmlns:dgm="http://schemas.openxmlformats.org/drawingml/2006/diagram" xmlns:a="http://schemas.openxmlformats.org/drawingml/2006/main" uniqueId="urn:microsoft.com/office/officeart/2005/8/layout/pList2">
   <dgm:title val=""/>
   <dgm:desc val=""/>
   <dgm:catLst>
-    <dgm:cat type="list" pri="14000"/>
-    <dgm:cat type="convert" pri="3000"/>
-    <dgm:cat type="picture" pri="27000"/>
-    <dgm:cat type="pictureconvert" pri="27000"/>
+    <dgm:cat type="list" pri="11000"/>
+    <dgm:cat type="picture" pri="24000"/>
+    <dgm:cat type="pictureconvert" pri="24000"/>
   </dgm:catLst>
   <dgm:sampData useDef="1">
     <dgm:dataModel>
@@ -15598,114 +16036,141 @@
       <dgm:whole/>
     </dgm:dataModel>
   </dgm:clrData>
-  <dgm:layoutNode name="linearFlow">
+  <dgm:layoutNode name="Name0">
     <dgm:varLst>
       <dgm:dir/>
       <dgm:resizeHandles val="exact"/>
     </dgm:varLst>
-    <dgm:alg type="lin">
-      <dgm:param type="linDir" val="fromT"/>
-      <dgm:param type="vertAlign" val="mid"/>
-      <dgm:param type="horzAlign" val="ctr"/>
-    </dgm:alg>
+    <dgm:alg type="composite"/>
     <dgm:shape xmlns:r="http://schemas.openxmlformats.org/officeDocument/2006/relationships" r:blip="">
       <dgm:adjLst/>
     </dgm:shape>
     <dgm:presOf/>
     <dgm:constrLst>
-      <dgm:constr type="w" for="ch" forName="composite" refType="w"/>
-      <dgm:constr type="h" for="ch" forName="composite" refType="h"/>
-      <dgm:constr type="h" for="ch" forName="spacing" refType="h" refFor="ch" refForName="composite" fact="0.25"/>
-      <dgm:constr type="h" for="ch" forName="spacing" refType="w" op="lte" fact="0.1"/>
-      <dgm:constr type="primFontSz" for="des" ptType="node" op="equ" val="65"/>
+      <dgm:constr type="w" for="ch" forName="bkgdShp" refType="w"/>
+      <dgm:constr type="h" for="ch" forName="bkgdShp" refType="h" fact="0.45"/>
+      <dgm:constr type="t" for="ch" forName="bkgdShp"/>
+      <dgm:constr type="w" for="ch" forName="linComp" refType="w" fact="0.94"/>
+      <dgm:constr type="h" for="ch" forName="linComp" refType="h"/>
+      <dgm:constr type="ctrX" for="ch" forName="linComp" refType="w" fact="0.5"/>
     </dgm:constrLst>
     <dgm:ruleLst/>
-    <dgm:forEach name="Name0" axis="ch" ptType="node">
-      <dgm:layoutNode name="composite">
-        <dgm:alg type="composite"/>
-        <dgm:shape xmlns:r="http://schemas.openxmlformats.org/officeDocument/2006/relationships" r:blip="">
-          <dgm:adjLst/>
-        </dgm:shape>
-        <dgm:presOf/>
-        <dgm:choose name="Name1">
-          <dgm:if name="Name2" func="var" arg="dir" op="equ" val="norm">
-            <dgm:constrLst>
-              <dgm:constr type="w" for="ch" forName="imgShp" refType="w" fact="0.335"/>
-              <dgm:constr type="h" for="ch" forName="imgShp" refType="w" refFor="ch" refForName="imgShp" op="equ"/>
-              <dgm:constr type="h" for="ch" forName="imgShp" refType="h" op="lte"/>
-              <dgm:constr type="ctrY" for="ch" forName="imgShp" refType="h" fact="0.5"/>
-              <dgm:constr type="l" for="ch" forName="imgShp"/>
-              <dgm:constr type="w" for="ch" forName="txShp" refType="w" op="equ" fact="0.665"/>
-              <dgm:constr type="h" for="ch" forName="txShp" refType="h" refFor="ch" refForName="imgShp" op="equ"/>
-              <dgm:constr type="ctrY" for="ch" forName="txShp" refType="h" fact="0.5"/>
-              <dgm:constr type="l" for="ch" forName="txShp" refType="w" refFor="ch" refForName="imgShp" fact="0.5"/>
-              <dgm:constr type="lMarg" for="ch" forName="txShp" refType="w" refFor="ch" refForName="imgShp" fact="1.25"/>
-            </dgm:constrLst>
-          </dgm:if>
-          <dgm:else name="Name3">
-            <dgm:constrLst>
-              <dgm:constr type="w" for="ch" forName="imgShp" refType="w" fact="0.335"/>
-              <dgm:constr type="h" for="ch" forName="imgShp" refType="w" refFor="ch" refForName="imgShp" op="equ"/>
-              <dgm:constr type="h" for="ch" forName="imgShp" refType="h" op="lte"/>
-              <dgm:constr type="ctrY" for="ch" forName="imgShp" refType="h" fact="0.5"/>
-              <dgm:constr type="r" for="ch" forName="imgShp" refType="w"/>
-              <dgm:constr type="w" for="ch" forName="txShp" refType="w" op="equ" fact="0.665"/>
-              <dgm:constr type="h" for="ch" forName="txShp" refType="h" refFor="ch" refForName="imgShp" op="equ"/>
-              <dgm:constr type="ctrY" for="ch" forName="txShp" refType="h" fact="0.5"/>
-              <dgm:constr type="r" for="ch" forName="txShp" refType="ctrX" refFor="ch" refForName="imgShp"/>
-              <dgm:constr type="rMarg" for="ch" forName="txShp" refType="w" refFor="ch" refForName="imgShp" fact="1.25"/>
-            </dgm:constrLst>
-          </dgm:else>
-        </dgm:choose>
-        <dgm:ruleLst/>
-        <dgm:layoutNode name="imgShp" styleLbl="fgImgPlace1">
+    <dgm:choose name="Name1">
+      <dgm:if name="Name2" axis="ch" ptType="node" func="cnt" op="gte" val="1">
+        <dgm:layoutNode name="bkgdShp" styleLbl="alignAccFollowNode1">
           <dgm:alg type="sp"/>
-          <dgm:shape xmlns:r="http://schemas.openxmlformats.org/officeDocument/2006/relationships" type="ellipse" r:blip="" blipPhldr="1">
-            <dgm:adjLst/>
+          <dgm:shape xmlns:r="http://schemas.openxmlformats.org/officeDocument/2006/relationships" type="roundRect" r:blip="">
+            <dgm:adjLst>
+              <dgm:adj idx="1" val="0.1"/>
+            </dgm:adjLst>
           </dgm:shape>
           <dgm:presOf/>
           <dgm:constrLst/>
           <dgm:ruleLst/>
         </dgm:layoutNode>
-        <dgm:layoutNode name="txShp">
-          <dgm:varLst>
-            <dgm:bulletEnabled val="1"/>
-          </dgm:varLst>
-          <dgm:alg type="tx"/>
-          <dgm:choose name="Name4">
-            <dgm:if name="Name5" func="var" arg="dir" op="equ" val="norm">
-              <dgm:shape xmlns:r="http://schemas.openxmlformats.org/officeDocument/2006/relationships" rot="180" type="homePlate" r:blip="" zOrderOff="-1">
-                <dgm:adjLst/>
-              </dgm:shape>
+        <dgm:layoutNode name="linComp">
+          <dgm:choose name="Name3">
+            <dgm:if name="Name4" func="var" arg="dir" op="equ" val="norm">
+              <dgm:alg type="lin"/>
             </dgm:if>
-            <dgm:else name="Name6">
-              <dgm:shape xmlns:r="http://schemas.openxmlformats.org/officeDocument/2006/relationships" type="homePlate" r:blip="" zOrderOff="-1">
-                <dgm:adjLst/>
-              </dgm:shape>
+            <dgm:else name="Name5">
+              <dgm:alg type="lin">
+                <dgm:param type="linDir" val="fromR"/>
+              </dgm:alg>
             </dgm:else>
           </dgm:choose>
-          <dgm:presOf axis="desOrSelf" ptType="node"/>
-          <dgm:constrLst>
-            <dgm:constr type="tMarg" refType="primFontSz" fact="0.3"/>
-            <dgm:constr type="bMarg" refType="primFontSz" fact="0.3"/>
-          </dgm:constrLst>
-          <dgm:ruleLst>
-            <dgm:rule type="primFontSz" val="5" fact="NaN" max="NaN"/>
-          </dgm:ruleLst>
-        </dgm:layoutNode>
-      </dgm:layoutNode>
-      <dgm:forEach name="Name7" axis="followSib" ptType="sibTrans" cnt="1">
-        <dgm:layoutNode name="spacing">
-          <dgm:alg type="sp"/>
           <dgm:shape xmlns:r="http://schemas.openxmlformats.org/officeDocument/2006/relationships" r:blip="">
             <dgm:adjLst/>
           </dgm:shape>
-          <dgm:presOf axis="self"/>
-          <dgm:constrLst/>
+          <dgm:presOf/>
+          <dgm:constrLst>
+            <dgm:constr type="w" for="ch" forName="compNode" refType="w"/>
+            <dgm:constr type="h" for="ch" forName="compNode" refType="h"/>
+            <dgm:constr type="w" for="ch" ptType="sibTrans" refType="w" refFor="ch" refForName="compNode" fact="0.1"/>
+            <dgm:constr type="h" for="ch" ptType="sibTrans" op="equ"/>
+            <dgm:constr type="h" for="ch" forName="compNode" op="equ"/>
+            <dgm:constr type="primFontSz" for="des" forName="node" op="equ"/>
+          </dgm:constrLst>
           <dgm:ruleLst/>
+          <dgm:forEach name="nodesForEach" axis="ch" ptType="node">
+            <dgm:layoutNode name="compNode">
+              <dgm:alg type="composite"/>
+              <dgm:shape xmlns:r="http://schemas.openxmlformats.org/officeDocument/2006/relationships" r:blip="">
+                <dgm:adjLst/>
+              </dgm:shape>
+              <dgm:presOf/>
+              <dgm:constrLst>
+                <dgm:constr type="w" for="ch" forName="node" refType="w"/>
+                <dgm:constr type="h" for="ch" forName="node" refType="h" fact="0.55"/>
+                <dgm:constr type="b" for="ch" forName="node" refType="h"/>
+                <dgm:constr type="w" for="ch" forName="invisiNode" refType="w" fact="0.75"/>
+                <dgm:constr type="h" for="ch" forName="invisiNode" refType="h" fact="0.06"/>
+                <dgm:constr type="t" for="ch" forName="invisiNode"/>
+                <dgm:constr type="w" for="ch" forName="imagNode" refType="w"/>
+                <dgm:constr type="h" for="ch" forName="imagNode" refType="h" fact="0.33"/>
+                <dgm:constr type="ctrX" for="ch" forName="imagNode" refType="w" fact="0.5"/>
+                <dgm:constr type="t" for="ch" forName="imagNode" refType="h" fact="0.06"/>
+              </dgm:constrLst>
+              <dgm:ruleLst/>
+              <dgm:layoutNode name="node" styleLbl="node1">
+                <dgm:varLst>
+                  <dgm:bulletEnabled val="1"/>
+                </dgm:varLst>
+                <dgm:alg type="tx">
+                  <dgm:param type="txAnchorVert" val="t"/>
+                </dgm:alg>
+                <dgm:shape xmlns:r="http://schemas.openxmlformats.org/officeDocument/2006/relationships" rot="180" type="round2SameRect" r:blip="">
+                  <dgm:adjLst>
+                    <dgm:adj idx="1" val="0.105"/>
+                  </dgm:adjLst>
+                </dgm:shape>
+                <dgm:presOf axis="desOrSelf" ptType="node"/>
+                <dgm:constrLst>
+                  <dgm:constr type="primFontSz" val="65"/>
+                </dgm:constrLst>
+                <dgm:ruleLst>
+                  <dgm:rule type="primFontSz" val="5" fact="NaN" max="NaN"/>
+                </dgm:ruleLst>
+              </dgm:layoutNode>
+              <dgm:layoutNode name="invisiNode">
+                <dgm:alg type="sp"/>
+                <dgm:shape xmlns:r="http://schemas.openxmlformats.org/officeDocument/2006/relationships" type="roundRect" r:blip="" hideGeom="1">
+                  <dgm:adjLst>
+                    <dgm:adj idx="1" val="0.1"/>
+                  </dgm:adjLst>
+                </dgm:shape>
+                <dgm:presOf/>
+                <dgm:constrLst/>
+                <dgm:ruleLst/>
+              </dgm:layoutNode>
+              <dgm:layoutNode name="imagNode" styleLbl="fgImgPlace1">
+                <dgm:alg type="sp"/>
+                <dgm:shape xmlns:r="http://schemas.openxmlformats.org/officeDocument/2006/relationships" type="roundRect" r:blip="" zOrderOff="-2" blipPhldr="1">
+                  <dgm:adjLst>
+                    <dgm:adj idx="1" val="0.1"/>
+                  </dgm:adjLst>
+                </dgm:shape>
+                <dgm:presOf/>
+                <dgm:constrLst/>
+                <dgm:ruleLst/>
+              </dgm:layoutNode>
+            </dgm:layoutNode>
+            <dgm:forEach name="sibTransForEach" axis="followSib" ptType="sibTrans" cnt="1">
+              <dgm:layoutNode name="sibTrans">
+                <dgm:alg type="sp"/>
+                <dgm:shape xmlns:r="http://schemas.openxmlformats.org/officeDocument/2006/relationships" type="rect" r:blip="" hideGeom="1">
+                  <dgm:adjLst/>
+                </dgm:shape>
+                <dgm:presOf axis="self"/>
+                <dgm:constrLst/>
+                <dgm:ruleLst/>
+              </dgm:layoutNode>
+            </dgm:forEach>
+          </dgm:forEach>
         </dgm:layoutNode>
-      </dgm:forEach>
-    </dgm:forEach>
+      </dgm:if>
+      <dgm:else name="Name6"/>
+    </dgm:choose>
   </dgm:layoutNode>
 </dgm:layoutDef>
 </file>
@@ -24596,7 +25061,7 @@
           <a:p>
             <a:fld id="{456E4759-72CA-4471-BABC-1F0CC9447A45}" type="datetimeFigureOut">
               <a:rPr lang="en-JM" smtClean="0"/>
-              <a:t>27/12/2020</a:t>
+              <a:t>10/1/2021</a:t>
             </a:fld>
             <a:endParaRPr lang="en-JM"/>
           </a:p>
@@ -25588,7 +26053,7 @@
           <a:p>
             <a:fld id="{C6D3A72B-C4E4-47BA-B339-69C8C2D54793}" type="datetimeFigureOut">
               <a:rPr lang="en-JM" smtClean="0"/>
-              <a:t>26/12/2020</a:t>
+              <a:t>10/1/2021</a:t>
             </a:fld>
             <a:endParaRPr lang="en-JM"/>
           </a:p>
@@ -25839,7 +26304,7 @@
           <a:p>
             <a:fld id="{C6D3A72B-C4E4-47BA-B339-69C8C2D54793}" type="datetimeFigureOut">
               <a:rPr lang="en-JM" smtClean="0"/>
-              <a:t>26/12/2020</a:t>
+              <a:t>10/1/2021</a:t>
             </a:fld>
             <a:endParaRPr lang="en-JM"/>
           </a:p>
@@ -26153,7 +26618,7 @@
           <a:p>
             <a:fld id="{C6D3A72B-C4E4-47BA-B339-69C8C2D54793}" type="datetimeFigureOut">
               <a:rPr lang="en-JM" smtClean="0"/>
-              <a:t>26/12/2020</a:t>
+              <a:t>10/1/2021</a:t>
             </a:fld>
             <a:endParaRPr lang="en-JM"/>
           </a:p>
@@ -26480,7 +26945,7 @@
           <a:p>
             <a:fld id="{C6D3A72B-C4E4-47BA-B339-69C8C2D54793}" type="datetimeFigureOut">
               <a:rPr lang="en-JM" smtClean="0"/>
-              <a:t>26/12/2020</a:t>
+              <a:t>10/1/2021</a:t>
             </a:fld>
             <a:endParaRPr lang="en-JM"/>
           </a:p>
@@ -26794,7 +27259,7 @@
           <a:p>
             <a:fld id="{C6D3A72B-C4E4-47BA-B339-69C8C2D54793}" type="datetimeFigureOut">
               <a:rPr lang="en-JM" smtClean="0"/>
-              <a:t>26/12/2020</a:t>
+              <a:t>10/1/2021</a:t>
             </a:fld>
             <a:endParaRPr lang="en-JM"/>
           </a:p>
@@ -27181,7 +27646,7 @@
           <a:p>
             <a:fld id="{C6D3A72B-C4E4-47BA-B339-69C8C2D54793}" type="datetimeFigureOut">
               <a:rPr lang="en-JM" smtClean="0"/>
-              <a:t>26/12/2020</a:t>
+              <a:t>10/1/2021</a:t>
             </a:fld>
             <a:endParaRPr lang="en-JM"/>
           </a:p>
@@ -27351,7 +27816,7 @@
           <a:p>
             <a:fld id="{C6D3A72B-C4E4-47BA-B339-69C8C2D54793}" type="datetimeFigureOut">
               <a:rPr lang="en-JM" smtClean="0"/>
-              <a:t>26/12/2020</a:t>
+              <a:t>10/1/2021</a:t>
             </a:fld>
             <a:endParaRPr lang="en-JM"/>
           </a:p>
@@ -27531,7 +27996,7 @@
           <a:p>
             <a:fld id="{C6D3A72B-C4E4-47BA-B339-69C8C2D54793}" type="datetimeFigureOut">
               <a:rPr lang="en-JM" smtClean="0"/>
-              <a:t>26/12/2020</a:t>
+              <a:t>10/1/2021</a:t>
             </a:fld>
             <a:endParaRPr lang="en-JM"/>
           </a:p>
@@ -27888,7 +28353,7 @@
           <a:p>
             <a:fld id="{C6D3A72B-C4E4-47BA-B339-69C8C2D54793}" type="datetimeFigureOut">
               <a:rPr lang="en-JM" smtClean="0"/>
-              <a:t>26/12/2020</a:t>
+              <a:t>10/1/2021</a:t>
             </a:fld>
             <a:endParaRPr lang="en-JM"/>
           </a:p>
@@ -28135,7 +28600,7 @@
           <a:p>
             <a:fld id="{C6D3A72B-C4E4-47BA-B339-69C8C2D54793}" type="datetimeFigureOut">
               <a:rPr lang="en-JM" smtClean="0"/>
-              <a:t>26/12/2020</a:t>
+              <a:t>10/1/2021</a:t>
             </a:fld>
             <a:endParaRPr lang="en-JM"/>
           </a:p>
@@ -28367,7 +28832,7 @@
           <a:p>
             <a:fld id="{C6D3A72B-C4E4-47BA-B339-69C8C2D54793}" type="datetimeFigureOut">
               <a:rPr lang="en-JM" smtClean="0"/>
-              <a:t>26/12/2020</a:t>
+              <a:t>10/1/2021</a:t>
             </a:fld>
             <a:endParaRPr lang="en-JM"/>
           </a:p>
@@ -28741,7 +29206,7 @@
           <a:p>
             <a:fld id="{C6D3A72B-C4E4-47BA-B339-69C8C2D54793}" type="datetimeFigureOut">
               <a:rPr lang="en-JM" smtClean="0"/>
-              <a:t>26/12/2020</a:t>
+              <a:t>10/1/2021</a:t>
             </a:fld>
             <a:endParaRPr lang="en-JM"/>
           </a:p>
@@ -28864,7 +29329,7 @@
           <a:p>
             <a:fld id="{C6D3A72B-C4E4-47BA-B339-69C8C2D54793}" type="datetimeFigureOut">
               <a:rPr lang="en-JM" smtClean="0"/>
-              <a:t>26/12/2020</a:t>
+              <a:t>10/1/2021</a:t>
             </a:fld>
             <a:endParaRPr lang="en-JM"/>
           </a:p>
@@ -28959,7 +29424,7 @@
           <a:p>
             <a:fld id="{C6D3A72B-C4E4-47BA-B339-69C8C2D54793}" type="datetimeFigureOut">
               <a:rPr lang="en-JM" smtClean="0"/>
-              <a:t>26/12/2020</a:t>
+              <a:t>10/1/2021</a:t>
             </a:fld>
             <a:endParaRPr lang="en-JM"/>
           </a:p>
@@ -29214,7 +29679,7 @@
           <a:p>
             <a:fld id="{C6D3A72B-C4E4-47BA-B339-69C8C2D54793}" type="datetimeFigureOut">
               <a:rPr lang="en-JM" smtClean="0"/>
-              <a:t>26/12/2020</a:t>
+              <a:t>10/1/2021</a:t>
             </a:fld>
             <a:endParaRPr lang="en-JM"/>
           </a:p>
@@ -29477,7 +29942,7 @@
           <a:p>
             <a:fld id="{C6D3A72B-C4E4-47BA-B339-69C8C2D54793}" type="datetimeFigureOut">
               <a:rPr lang="en-JM" smtClean="0"/>
-              <a:t>26/12/2020</a:t>
+              <a:t>10/1/2021</a:t>
             </a:fld>
             <a:endParaRPr lang="en-JM"/>
           </a:p>
@@ -30222,7 +30687,7 @@
           <a:p>
             <a:fld id="{C6D3A72B-C4E4-47BA-B339-69C8C2D54793}" type="datetimeFigureOut">
               <a:rPr lang="en-JM" smtClean="0"/>
-              <a:t>26/12/2020</a:t>
+              <a:t>10/1/2021</a:t>
             </a:fld>
             <a:endParaRPr lang="en-JM"/>
           </a:p>
@@ -31906,28 +32371,28 @@
           <p:nvPr>
             <p:extLst>
               <p:ext uri="{D42A27DB-BD31-4B8C-83A1-F6EECF244321}">
-                <p14:modId xmlns:p14="http://schemas.microsoft.com/office/powerpoint/2010/main" val="541113083"/>
+                <p14:modId xmlns:p14="http://schemas.microsoft.com/office/powerpoint/2010/main" val="3521185537"/>
               </p:ext>
             </p:extLst>
           </p:nvPr>
         </p:nvGraphicFramePr>
         <p:xfrm>
           <a:off x="473470" y="2280537"/>
-          <a:ext cx="4223168" cy="3762260"/>
+          <a:ext cx="4203045" cy="3762260"/>
         </p:xfrm>
         <a:graphic>
           <a:graphicData uri="http://schemas.openxmlformats.org/drawingml/2006/table">
             <a:tbl>
               <a:tblPr/>
               <a:tblGrid>
-                <a:gridCol w="2111584">
+                <a:gridCol w="1860796">
                   <a:extLst>
                     <a:ext uri="{9D8B030D-6E8A-4147-A177-3AD203B41FA5}">
                       <a16:colId xmlns:a16="http://schemas.microsoft.com/office/drawing/2014/main" val="2833417707"/>
                     </a:ext>
                   </a:extLst>
                 </a:gridCol>
-                <a:gridCol w="2111584">
+                <a:gridCol w="2342249">
                   <a:extLst>
                     <a:ext uri="{9D8B030D-6E8A-4147-A177-3AD203B41FA5}">
                       <a16:colId xmlns:a16="http://schemas.microsoft.com/office/drawing/2014/main" val="2441303241"/>
@@ -35702,7 +36167,7 @@
             <p:ph idx="1"/>
             <p:extLst>
               <p:ext uri="{D42A27DB-BD31-4B8C-83A1-F6EECF244321}">
-                <p14:modId xmlns:p14="http://schemas.microsoft.com/office/powerpoint/2010/main" val="3121408616"/>
+                <p14:modId xmlns:p14="http://schemas.microsoft.com/office/powerpoint/2010/main" val="4200215230"/>
               </p:ext>
             </p:extLst>
           </p:nvPr>
@@ -36228,7 +36693,7 @@
             <p:ph idx="1"/>
             <p:extLst>
               <p:ext uri="{D42A27DB-BD31-4B8C-83A1-F6EECF244321}">
-                <p14:modId xmlns:p14="http://schemas.microsoft.com/office/powerpoint/2010/main" val="1032901969"/>
+                <p14:modId xmlns:p14="http://schemas.microsoft.com/office/powerpoint/2010/main" val="3693597324"/>
               </p:ext>
             </p:extLst>
           </p:nvPr>
@@ -36754,7 +37219,7 @@
             <p:ph idx="1"/>
             <p:extLst>
               <p:ext uri="{D42A27DB-BD31-4B8C-83A1-F6EECF244321}">
-                <p14:modId xmlns:p14="http://schemas.microsoft.com/office/powerpoint/2010/main" val="3012044446"/>
+                <p14:modId xmlns:p14="http://schemas.microsoft.com/office/powerpoint/2010/main" val="256579376"/>
               </p:ext>
             </p:extLst>
           </p:nvPr>
@@ -38979,7 +39444,7 @@
             <p:ph idx="1"/>
             <p:extLst>
               <p:ext uri="{D42A27DB-BD31-4B8C-83A1-F6EECF244321}">
-                <p14:modId xmlns:p14="http://schemas.microsoft.com/office/powerpoint/2010/main" val="1358869648"/>
+                <p14:modId xmlns:p14="http://schemas.microsoft.com/office/powerpoint/2010/main" val="1674666998"/>
               </p:ext>
             </p:extLst>
           </p:nvPr>
@@ -39307,7 +39772,7 @@
                             <a:srgbClr val="0070C0"/>
                           </a:solidFill>
                         </a:rPr>
-                        <a:t>*</a:t>
+                        <a:t>0</a:t>
                       </a:r>
                     </a:p>
                   </a:txBody>
@@ -39325,7 +39790,7 @@
                             <a:srgbClr val="0070C0"/>
                           </a:solidFill>
                         </a:rPr>
-                        <a:t>*</a:t>
+                        <a:t>0</a:t>
                       </a:r>
                     </a:p>
                   </a:txBody>
@@ -39343,7 +39808,7 @@
                             <a:srgbClr val="0070C0"/>
                           </a:solidFill>
                         </a:rPr>
-                        <a:t>*</a:t>
+                        <a:t>9</a:t>
                       </a:r>
                     </a:p>
                   </a:txBody>
@@ -39379,7 +39844,7 @@
                             <a:srgbClr val="0070C0"/>
                           </a:solidFill>
                         </a:rPr>
-                        <a:t>*</a:t>
+                        <a:t>9</a:t>
                       </a:r>
                     </a:p>
                   </a:txBody>
@@ -39397,7 +39862,7 @@
                             <a:srgbClr val="0070C0"/>
                           </a:solidFill>
                         </a:rPr>
-                        <a:t>*</a:t>
+                        <a:t>9</a:t>
                       </a:r>
                     </a:p>
                   </a:txBody>
@@ -39455,20 +39920,43 @@
                     <a:lstStyle/>
                     <a:p>
                       <a:pPr algn="ctr"/>
-                      <a:endParaRPr lang="en-JM" sz="6000" dirty="0"/>
-                    </a:p>
-                  </a:txBody>
-                  <a:tcPr anchor="ctr"/>
-                </a:tc>
-                <a:tc>
-                  <a:txBody>
-                    <a:bodyPr/>
-                    <a:lstStyle/>
-                    <a:p>
-                      <a:pPr algn="ctr"/>
                       <a:r>
                         <a:rPr lang="en-JM" sz="6000" dirty="0"/>
                         <a:t>@</a:t>
+                      </a:r>
+                    </a:p>
+                  </a:txBody>
+                  <a:tcPr anchor="ctr"/>
+                </a:tc>
+                <a:tc>
+                  <a:txBody>
+                    <a:bodyPr/>
+                    <a:lstStyle/>
+                    <a:p>
+                      <a:pPr marL="0" marR="0" lvl="0" indent="0" algn="ctr" defTabSz="457200" rtl="0" eaLnBrk="1" fontAlgn="auto" latinLnBrk="0" hangingPunct="1">
+                        <a:lnSpc>
+                          <a:spcPct val="100000"/>
+                        </a:lnSpc>
+                        <a:spcBef>
+                          <a:spcPts val="0"/>
+                        </a:spcBef>
+                        <a:spcAft>
+                          <a:spcPts val="0"/>
+                        </a:spcAft>
+                        <a:buClrTx/>
+                        <a:buSzTx/>
+                        <a:buFontTx/>
+                        <a:buNone/>
+                        <a:tabLst/>
+                        <a:defRPr/>
+                      </a:pPr>
+                      <a:r>
+                        <a:rPr lang="en-JM" sz="6000" dirty="0">
+                          <a:solidFill>
+                            <a:srgbClr val="0070C0"/>
+                          </a:solidFill>
+                        </a:rPr>
+                        <a:t>0</a:t>
                       </a:r>
                     </a:p>
                   </a:txBody>
@@ -39486,125 +39974,7 @@
                             <a:srgbClr val="0070C0"/>
                           </a:solidFill>
                         </a:rPr>
-                        <a:t>*</a:t>
-                      </a:r>
-                    </a:p>
-                  </a:txBody>
-                  <a:tcPr anchor="ctr"/>
-                </a:tc>
-                <a:tc>
-                  <a:txBody>
-                    <a:bodyPr/>
-                    <a:lstStyle/>
-                    <a:p>
-                      <a:pPr algn="ctr"/>
-                      <a:r>
-                        <a:rPr lang="en-JM" sz="6000" dirty="0">
-                          <a:solidFill>
-                            <a:srgbClr val="0070C0"/>
-                          </a:solidFill>
-                        </a:rPr>
-                        <a:t>*</a:t>
-                      </a:r>
-                    </a:p>
-                  </a:txBody>
-                  <a:tcPr anchor="ctr"/>
-                </a:tc>
-                <a:tc>
-                  <a:txBody>
-                    <a:bodyPr/>
-                    <a:lstStyle/>
-                    <a:p>
-                      <a:pPr algn="ctr"/>
-                      <a:r>
-                        <a:rPr lang="en-JM" sz="6000" dirty="0"/>
-                        <a:t>%</a:t>
-                      </a:r>
-                    </a:p>
-                  </a:txBody>
-                  <a:tcPr anchor="ctr"/>
-                </a:tc>
-                <a:tc>
-                  <a:txBody>
-                    <a:bodyPr/>
-                    <a:lstStyle/>
-                    <a:p>
-                      <a:pPr algn="ctr"/>
-                      <a:endParaRPr lang="en-JM" sz="6000" dirty="0"/>
-                    </a:p>
-                  </a:txBody>
-                  <a:tcPr anchor="ctr"/>
-                </a:tc>
-                <a:extLst>
-                  <a:ext uri="{0D108BD9-81ED-4DB2-BD59-A6C34878D82A}">
-                    <a16:rowId xmlns:a16="http://schemas.microsoft.com/office/drawing/2014/main" val="10001"/>
-                  </a:ext>
-                </a:extLst>
-              </a:tr>
-              <a:tr h="1416731">
-                <a:tc>
-                  <a:txBody>
-                    <a:bodyPr/>
-                    <a:lstStyle/>
-                    <a:p>
-                      <a:pPr algn="ctr"/>
-                      <a:r>
-                        <a:rPr lang="en-JM" sz="6000" dirty="0"/>
-                        <a:t>P</a:t>
-                      </a:r>
-                    </a:p>
-                  </a:txBody>
-                  <a:tcPr anchor="ctr"/>
-                </a:tc>
-                <a:tc>
-                  <a:txBody>
-                    <a:bodyPr/>
-                    <a:lstStyle/>
-                    <a:p>
-                      <a:pPr algn="ctr"/>
-                      <a:r>
-                        <a:rPr lang="en-JM" sz="6000" dirty="0">
-                          <a:solidFill>
-                            <a:srgbClr val="0070C0"/>
-                          </a:solidFill>
-                        </a:rPr>
-                        <a:t>*</a:t>
-                      </a:r>
-                    </a:p>
-                  </a:txBody>
-                  <a:tcPr anchor="ctr"/>
-                </a:tc>
-                <a:tc>
-                  <a:txBody>
-                    <a:bodyPr/>
-                    <a:lstStyle/>
-                    <a:p>
-                      <a:pPr algn="ctr"/>
-                      <a:r>
-                        <a:rPr lang="en-JM" sz="6000" dirty="0">
-                          <a:solidFill>
-                            <a:srgbClr val="0070C0"/>
-                          </a:solidFill>
-                        </a:rPr>
-                        <a:t>*</a:t>
-                      </a:r>
-                    </a:p>
-                  </a:txBody>
-                  <a:tcPr anchor="ctr"/>
-                </a:tc>
-                <a:tc>
-                  <a:txBody>
-                    <a:bodyPr/>
-                    <a:lstStyle/>
-                    <a:p>
-                      <a:pPr algn="ctr"/>
-                      <a:r>
-                        <a:rPr lang="en-JM" sz="6000" dirty="0">
-                          <a:solidFill>
-                            <a:srgbClr val="0070C0"/>
-                          </a:solidFill>
-                        </a:rPr>
-                        <a:t>*</a:t>
+                        <a:t>9</a:t>
                       </a:r>
                     </a:p>
                   </a:txBody>
@@ -39633,6 +40003,96 @@
                     <a:bodyPr/>
                     <a:lstStyle/>
                     <a:p>
+                      <a:pPr marL="0" marR="0" lvl="0" indent="0" algn="ctr" defTabSz="457200" rtl="0" eaLnBrk="1" fontAlgn="auto" latinLnBrk="0" hangingPunct="1">
+                        <a:lnSpc>
+                          <a:spcPct val="100000"/>
+                        </a:lnSpc>
+                        <a:spcBef>
+                          <a:spcPts val="0"/>
+                        </a:spcBef>
+                        <a:spcAft>
+                          <a:spcPts val="0"/>
+                        </a:spcAft>
+                        <a:buClrTx/>
+                        <a:buSzTx/>
+                        <a:buFontTx/>
+                        <a:buNone/>
+                        <a:tabLst/>
+                        <a:defRPr/>
+                      </a:pPr>
+                      <a:r>
+                        <a:rPr lang="en-JM" sz="6000">
+                          <a:solidFill>
+                            <a:srgbClr val="0070C0"/>
+                          </a:solidFill>
+                        </a:rPr>
+                        <a:t>9</a:t>
+                      </a:r>
+                      <a:endParaRPr lang="en-JM" sz="6000" dirty="0">
+                        <a:solidFill>
+                          <a:srgbClr val="0070C0"/>
+                        </a:solidFill>
+                      </a:endParaRPr>
+                    </a:p>
+                  </a:txBody>
+                  <a:tcPr anchor="ctr"/>
+                </a:tc>
+                <a:tc>
+                  <a:txBody>
+                    <a:bodyPr/>
+                    <a:lstStyle/>
+                    <a:p>
+                      <a:pPr marL="0" marR="0" lvl="0" indent="0" algn="ctr" defTabSz="457200" rtl="0" eaLnBrk="1" fontAlgn="auto" latinLnBrk="0" hangingPunct="1">
+                        <a:lnSpc>
+                          <a:spcPct val="100000"/>
+                        </a:lnSpc>
+                        <a:spcBef>
+                          <a:spcPts val="0"/>
+                        </a:spcBef>
+                        <a:spcAft>
+                          <a:spcPts val="0"/>
+                        </a:spcAft>
+                        <a:buClrTx/>
+                        <a:buSzTx/>
+                        <a:buFontTx/>
+                        <a:buNone/>
+                        <a:tabLst/>
+                        <a:defRPr/>
+                      </a:pPr>
+                      <a:r>
+                        <a:rPr lang="en-JM" sz="6000" dirty="0"/>
+                        <a:t>%</a:t>
+                      </a:r>
+                    </a:p>
+                  </a:txBody>
+                  <a:tcPr anchor="ctr"/>
+                </a:tc>
+                <a:extLst>
+                  <a:ext uri="{0D108BD9-81ED-4DB2-BD59-A6C34878D82A}">
+                    <a16:rowId xmlns:a16="http://schemas.microsoft.com/office/drawing/2014/main" val="10001"/>
+                  </a:ext>
+                </a:extLst>
+              </a:tr>
+              <a:tr h="1416731">
+                <a:tc>
+                  <a:txBody>
+                    <a:bodyPr/>
+                    <a:lstStyle/>
+                    <a:p>
+                      <a:pPr algn="ctr"/>
+                      <a:r>
+                        <a:rPr lang="en-JM" sz="6000" dirty="0"/>
+                        <a:t>P</a:t>
+                      </a:r>
+                    </a:p>
+                  </a:txBody>
+                  <a:tcPr anchor="ctr"/>
+                </a:tc>
+                <a:tc>
+                  <a:txBody>
+                    <a:bodyPr/>
+                    <a:lstStyle/>
+                    <a:p>
                       <a:pPr algn="ctr"/>
                       <a:r>
                         <a:rPr lang="en-JM" sz="6000" dirty="0">
@@ -39640,7 +40100,7 @@
                             <a:srgbClr val="0070C0"/>
                           </a:solidFill>
                         </a:rPr>
-                        <a:t>*</a:t>
+                        <a:t>0</a:t>
                       </a:r>
                     </a:p>
                   </a:txBody>
@@ -39658,7 +40118,79 @@
                             <a:srgbClr val="0070C0"/>
                           </a:solidFill>
                         </a:rPr>
-                        <a:t>*</a:t>
+                        <a:t>0</a:t>
+                      </a:r>
+                    </a:p>
+                  </a:txBody>
+                  <a:tcPr anchor="ctr"/>
+                </a:tc>
+                <a:tc>
+                  <a:txBody>
+                    <a:bodyPr/>
+                    <a:lstStyle/>
+                    <a:p>
+                      <a:pPr algn="ctr"/>
+                      <a:r>
+                        <a:rPr lang="en-JM" sz="6000" dirty="0">
+                          <a:solidFill>
+                            <a:srgbClr val="0070C0"/>
+                          </a:solidFill>
+                        </a:rPr>
+                        <a:t>9</a:t>
+                      </a:r>
+                    </a:p>
+                  </a:txBody>
+                  <a:tcPr anchor="ctr"/>
+                </a:tc>
+                <a:tc>
+                  <a:txBody>
+                    <a:bodyPr/>
+                    <a:lstStyle/>
+                    <a:p>
+                      <a:pPr algn="ctr"/>
+                      <a:r>
+                        <a:rPr lang="en-JM" sz="6000" dirty="0">
+                          <a:solidFill>
+                            <a:srgbClr val="0070C0"/>
+                          </a:solidFill>
+                        </a:rPr>
+                        <a:t>.</a:t>
+                      </a:r>
+                    </a:p>
+                  </a:txBody>
+                  <a:tcPr anchor="ctr"/>
+                </a:tc>
+                <a:tc>
+                  <a:txBody>
+                    <a:bodyPr/>
+                    <a:lstStyle/>
+                    <a:p>
+                      <a:pPr algn="ctr"/>
+                      <a:r>
+                        <a:rPr lang="en-JM" sz="6000" dirty="0">
+                          <a:solidFill>
+                            <a:srgbClr val="0070C0"/>
+                          </a:solidFill>
+                        </a:rPr>
+                        <a:t>9</a:t>
+                      </a:r>
+                    </a:p>
+                  </a:txBody>
+                  <a:tcPr anchor="ctr"/>
+                </a:tc>
+                <a:tc>
+                  <a:txBody>
+                    <a:bodyPr/>
+                    <a:lstStyle/>
+                    <a:p>
+                      <a:pPr algn="ctr"/>
+                      <a:r>
+                        <a:rPr lang="en-JM" sz="6000" dirty="0">
+                          <a:solidFill>
+                            <a:srgbClr val="0070C0"/>
+                          </a:solidFill>
+                        </a:rPr>
+                        <a:t>9</a:t>
                       </a:r>
                     </a:p>
                   </a:txBody>
@@ -39747,7 +40279,7 @@
                             <a:srgbClr val="0070C0"/>
                           </a:solidFill>
                         </a:rPr>
-                        <a:t>*</a:t>
+                        <a:t>9</a:t>
                       </a:r>
                     </a:p>
                   </a:txBody>
@@ -39788,7 +40320,7 @@
                             <a:srgbClr val="0070C0"/>
                           </a:solidFill>
                         </a:rPr>
-                        <a:t>*</a:t>
+                        <a:t>9</a:t>
                       </a:r>
                     </a:p>
                   </a:txBody>

</xml_diff>